<commit_message>
Update tests for styling capability
</commit_message>
<xml_diff>
--- a/doc/test/AgendaSlidesTextHierarchicalAfterSync.pptx
+++ b/doc/test/AgendaSlidesTextHierarchicalAfterSync.pptx
@@ -275,7 +275,7 @@
           <a:p>
             <a:fld id="{B32105C1-24C8-45D1-A21F-C6A549AEEE91}" type="datetimeFigureOut">
               <a:rPr lang="en-US" smtClean="0"/>
-              <a:t>2/23/2017</a:t>
+              <a:t>3/21/2017</a:t>
             </a:fld>
             <a:endParaRPr lang="en-US"/>
           </a:p>
@@ -759,7 +759,7 @@
           <a:p>
             <a:fld id="{7E609FDA-3975-45C4-B655-88143015D3AE}" type="datetimeFigureOut">
               <a:rPr lang="en-US" smtClean="0"/>
-              <a:t>2/23/2017</a:t>
+              <a:t>3/21/2017</a:t>
             </a:fld>
             <a:endParaRPr lang="en-US"/>
           </a:p>
@@ -927,7 +927,7 @@
           <a:p>
             <a:fld id="{7E609FDA-3975-45C4-B655-88143015D3AE}" type="datetimeFigureOut">
               <a:rPr lang="en-US" smtClean="0"/>
-              <a:t>2/23/2017</a:t>
+              <a:t>3/21/2017</a:t>
             </a:fld>
             <a:endParaRPr lang="en-US"/>
           </a:p>
@@ -1105,7 +1105,7 @@
           <a:p>
             <a:fld id="{7E609FDA-3975-45C4-B655-88143015D3AE}" type="datetimeFigureOut">
               <a:rPr lang="en-US" smtClean="0"/>
-              <a:t>2/23/2017</a:t>
+              <a:t>3/21/2017</a:t>
             </a:fld>
             <a:endParaRPr lang="en-US"/>
           </a:p>
@@ -1273,7 +1273,7 @@
           <a:p>
             <a:fld id="{7E609FDA-3975-45C4-B655-88143015D3AE}" type="datetimeFigureOut">
               <a:rPr lang="en-US" smtClean="0"/>
-              <a:t>2/23/2017</a:t>
+              <a:t>3/21/2017</a:t>
             </a:fld>
             <a:endParaRPr lang="en-US"/>
           </a:p>
@@ -1463,7 +1463,7 @@
           <a:p>
             <a:fld id="{375DF146-F883-4712-8AA9-41CC6C1918AD}" type="datetimeFigureOut">
               <a:rPr lang="en-US" smtClean="0"/>
-              <a:t>2/23/2017</a:t>
+              <a:t>3/21/2017</a:t>
             </a:fld>
             <a:endParaRPr lang="en-US"/>
           </a:p>
@@ -1631,7 +1631,7 @@
           <a:p>
             <a:fld id="{375DF146-F883-4712-8AA9-41CC6C1918AD}" type="datetimeFigureOut">
               <a:rPr lang="en-US" smtClean="0"/>
-              <a:t>2/23/2017</a:t>
+              <a:t>3/21/2017</a:t>
             </a:fld>
             <a:endParaRPr lang="en-US"/>
           </a:p>
@@ -1876,7 +1876,7 @@
           <a:p>
             <a:fld id="{375DF146-F883-4712-8AA9-41CC6C1918AD}" type="datetimeFigureOut">
               <a:rPr lang="en-US" smtClean="0"/>
-              <a:t>2/23/2017</a:t>
+              <a:t>3/21/2017</a:t>
             </a:fld>
             <a:endParaRPr lang="en-US"/>
           </a:p>
@@ -2105,7 +2105,7 @@
           <a:p>
             <a:fld id="{375DF146-F883-4712-8AA9-41CC6C1918AD}" type="datetimeFigureOut">
               <a:rPr lang="en-US" smtClean="0"/>
-              <a:t>2/23/2017</a:t>
+              <a:t>3/21/2017</a:t>
             </a:fld>
             <a:endParaRPr lang="en-US"/>
           </a:p>
@@ -2469,7 +2469,7 @@
           <a:p>
             <a:fld id="{375DF146-F883-4712-8AA9-41CC6C1918AD}" type="datetimeFigureOut">
               <a:rPr lang="en-US" smtClean="0"/>
-              <a:t>2/23/2017</a:t>
+              <a:t>3/21/2017</a:t>
             </a:fld>
             <a:endParaRPr lang="en-US"/>
           </a:p>
@@ -2586,7 +2586,7 @@
           <a:p>
             <a:fld id="{375DF146-F883-4712-8AA9-41CC6C1918AD}" type="datetimeFigureOut">
               <a:rPr lang="en-US" smtClean="0"/>
-              <a:t>2/23/2017</a:t>
+              <a:t>3/21/2017</a:t>
             </a:fld>
             <a:endParaRPr lang="en-US"/>
           </a:p>
@@ -2681,7 +2681,7 @@
           <a:p>
             <a:fld id="{375DF146-F883-4712-8AA9-41CC6C1918AD}" type="datetimeFigureOut">
               <a:rPr lang="en-US" smtClean="0"/>
-              <a:t>2/23/2017</a:t>
+              <a:t>3/21/2017</a:t>
             </a:fld>
             <a:endParaRPr lang="en-US"/>
           </a:p>
@@ -2849,7 +2849,7 @@
           <a:p>
             <a:fld id="{7E609FDA-3975-45C4-B655-88143015D3AE}" type="datetimeFigureOut">
               <a:rPr lang="en-US" smtClean="0"/>
-              <a:t>2/23/2017</a:t>
+              <a:t>3/21/2017</a:t>
             </a:fld>
             <a:endParaRPr lang="en-US"/>
           </a:p>
@@ -3124,7 +3124,7 @@
           <a:p>
             <a:fld id="{375DF146-F883-4712-8AA9-41CC6C1918AD}" type="datetimeFigureOut">
               <a:rPr lang="en-US" smtClean="0"/>
-              <a:t>2/23/2017</a:t>
+              <a:t>3/21/2017</a:t>
             </a:fld>
             <a:endParaRPr lang="en-US"/>
           </a:p>
@@ -3376,7 +3376,7 @@
           <a:p>
             <a:fld id="{375DF146-F883-4712-8AA9-41CC6C1918AD}" type="datetimeFigureOut">
               <a:rPr lang="en-US" smtClean="0"/>
-              <a:t>2/23/2017</a:t>
+              <a:t>3/21/2017</a:t>
             </a:fld>
             <a:endParaRPr lang="en-US"/>
           </a:p>
@@ -3544,7 +3544,7 @@
           <a:p>
             <a:fld id="{375DF146-F883-4712-8AA9-41CC6C1918AD}" type="datetimeFigureOut">
               <a:rPr lang="en-US" smtClean="0"/>
-              <a:t>2/23/2017</a:t>
+              <a:t>3/21/2017</a:t>
             </a:fld>
             <a:endParaRPr lang="en-US"/>
           </a:p>
@@ -3722,7 +3722,7 @@
           <a:p>
             <a:fld id="{375DF146-F883-4712-8AA9-41CC6C1918AD}" type="datetimeFigureOut">
               <a:rPr lang="en-US" smtClean="0"/>
-              <a:t>2/23/2017</a:t>
+              <a:t>3/21/2017</a:t>
             </a:fld>
             <a:endParaRPr lang="en-US"/>
           </a:p>
@@ -3890,7 +3890,7 @@
           <a:p>
             <a:fld id="{7E609FDA-3975-45C4-B655-88143015D3AE}" type="datetimeFigureOut">
               <a:rPr lang="en-US" smtClean="0"/>
-              <a:t>2/23/2017</a:t>
+              <a:t>3/21/2017</a:t>
             </a:fld>
             <a:endParaRPr lang="en-US"/>
           </a:p>
@@ -4135,7 +4135,7 @@
           <a:p>
             <a:fld id="{7E609FDA-3975-45C4-B655-88143015D3AE}" type="datetimeFigureOut">
               <a:rPr lang="en-US" smtClean="0"/>
-              <a:t>2/23/2017</a:t>
+              <a:t>3/21/2017</a:t>
             </a:fld>
             <a:endParaRPr lang="en-US"/>
           </a:p>
@@ -4364,7 +4364,7 @@
           <a:p>
             <a:fld id="{7E609FDA-3975-45C4-B655-88143015D3AE}" type="datetimeFigureOut">
               <a:rPr lang="en-US" smtClean="0"/>
-              <a:t>2/23/2017</a:t>
+              <a:t>3/21/2017</a:t>
             </a:fld>
             <a:endParaRPr lang="en-US"/>
           </a:p>
@@ -4728,7 +4728,7 @@
           <a:p>
             <a:fld id="{7E609FDA-3975-45C4-B655-88143015D3AE}" type="datetimeFigureOut">
               <a:rPr lang="en-US" smtClean="0"/>
-              <a:t>2/23/2017</a:t>
+              <a:t>3/21/2017</a:t>
             </a:fld>
             <a:endParaRPr lang="en-US"/>
           </a:p>
@@ -4845,7 +4845,7 @@
           <a:p>
             <a:fld id="{7E609FDA-3975-45C4-B655-88143015D3AE}" type="datetimeFigureOut">
               <a:rPr lang="en-US" smtClean="0"/>
-              <a:t>2/23/2017</a:t>
+              <a:t>3/21/2017</a:t>
             </a:fld>
             <a:endParaRPr lang="en-US"/>
           </a:p>
@@ -4940,7 +4940,7 @@
           <a:p>
             <a:fld id="{7E609FDA-3975-45C4-B655-88143015D3AE}" type="datetimeFigureOut">
               <a:rPr lang="en-US" smtClean="0"/>
-              <a:t>2/23/2017</a:t>
+              <a:t>3/21/2017</a:t>
             </a:fld>
             <a:endParaRPr lang="en-US"/>
           </a:p>
@@ -5215,7 +5215,7 @@
           <a:p>
             <a:fld id="{7E609FDA-3975-45C4-B655-88143015D3AE}" type="datetimeFigureOut">
               <a:rPr lang="en-US" smtClean="0"/>
-              <a:t>2/23/2017</a:t>
+              <a:t>3/21/2017</a:t>
             </a:fld>
             <a:endParaRPr lang="en-US"/>
           </a:p>
@@ -5467,7 +5467,7 @@
           <a:p>
             <a:fld id="{7E609FDA-3975-45C4-B655-88143015D3AE}" type="datetimeFigureOut">
               <a:rPr lang="en-US" smtClean="0"/>
-              <a:t>2/23/2017</a:t>
+              <a:t>3/21/2017</a:t>
             </a:fld>
             <a:endParaRPr lang="en-US"/>
           </a:p>
@@ -5678,7 +5678,7 @@
           <a:p>
             <a:fld id="{7E609FDA-3975-45C4-B655-88143015D3AE}" type="datetimeFigureOut">
               <a:rPr lang="en-US" smtClean="0"/>
-              <a:t>2/23/2017</a:t>
+              <a:t>3/21/2017</a:t>
             </a:fld>
             <a:endParaRPr lang="en-US"/>
           </a:p>
@@ -6220,7 +6220,7 @@
           <a:p>
             <a:fld id="{375DF146-F883-4712-8AA9-41CC6C1918AD}" type="datetimeFigureOut">
               <a:rPr lang="en-US" smtClean="0"/>
-              <a:t>2/23/2017</a:t>
+              <a:t>3/21/2017</a:t>
             </a:fld>
             <a:endParaRPr lang="en-US"/>
           </a:p>
@@ -6712,11 +6712,13 @@
         </p:nvSpPr>
         <p:spPr/>
         <p:txBody>
-          <a:bodyPr/>
+          <a:bodyPr>
+            <a:normAutofit fontScale="40000" lnSpcReduction="20000"/>
+          </a:bodyPr>
           <a:lstStyle/>
           <a:p>
             <a:r>
-              <a:rPr lang="en-US">
+              <a:rPr lang="en-US" b="1" dirty="0">
                 <a:solidFill>
                   <a:srgbClr val="808080"/>
                 </a:solidFill>
@@ -6725,62 +6727,292 @@
             </a:r>
           </a:p>
           <a:p>
-            <a:r>
-              <a:rPr lang="en-US">
-                <a:solidFill>
-                  <a:srgbClr val="FF0000"/>
+            <a:pPr lvl="1"/>
+            <a:r>
+              <a:rPr lang="en-US" dirty="0">
+                <a:solidFill>
+                  <a:srgbClr val="808080"/>
+                </a:solidFill>
+              </a:rPr>
+              <a:t>Level 2</a:t>
+            </a:r>
+          </a:p>
+          <a:p>
+            <a:pPr lvl="2"/>
+            <a:r>
+              <a:rPr lang="en-US" b="1" u="sng" dirty="0">
+                <a:solidFill>
+                  <a:schemeClr val="accent6"/>
+                </a:solidFill>
+              </a:rPr>
+              <a:t>Level 3</a:t>
+            </a:r>
+          </a:p>
+          <a:p>
+            <a:pPr lvl="3"/>
+            <a:r>
+              <a:rPr lang="en-US" dirty="0">
+                <a:solidFill>
+                  <a:srgbClr val="808080"/>
+                </a:solidFill>
+              </a:rPr>
+              <a:t>Level 4</a:t>
+            </a:r>
+          </a:p>
+          <a:p>
+            <a:pPr lvl="4"/>
+            <a:r>
+              <a:rPr lang="en-US" dirty="0">
+                <a:solidFill>
+                  <a:srgbClr val="808080"/>
+                </a:solidFill>
+              </a:rPr>
+              <a:t>Level 5</a:t>
+            </a:r>
+          </a:p>
+          <a:p>
+            <a:pPr lvl="5"/>
+            <a:r>
+              <a:rPr lang="en-US" dirty="0">
+                <a:solidFill>
+                  <a:srgbClr val="808080"/>
+                </a:solidFill>
+              </a:rPr>
+              <a:t>Level 6</a:t>
+            </a:r>
+          </a:p>
+          <a:p>
+            <a:pPr lvl="6"/>
+            <a:r>
+              <a:rPr lang="en-US" dirty="0">
+                <a:solidFill>
+                  <a:srgbClr val="808080"/>
+                </a:solidFill>
+              </a:rPr>
+              <a:t>Level 7</a:t>
+            </a:r>
+          </a:p>
+          <a:p>
+            <a:pPr lvl="7"/>
+            <a:r>
+              <a:rPr lang="en-US" dirty="0">
+                <a:solidFill>
+                  <a:srgbClr val="808080"/>
+                </a:solidFill>
+              </a:rPr>
+              <a:t>Level 8</a:t>
+            </a:r>
+          </a:p>
+          <a:p>
+            <a:pPr lvl="8"/>
+            <a:r>
+              <a:rPr lang="en-US" b="1" i="1" dirty="0">
+                <a:solidFill>
+                  <a:srgbClr val="808080"/>
+                </a:solidFill>
+              </a:rPr>
+              <a:t>Level 9</a:t>
+            </a:r>
+          </a:p>
+          <a:p>
+            <a:r>
+              <a:rPr lang="en-US" i="1" dirty="0">
+                <a:solidFill>
+                  <a:schemeClr val="accent5">
+                    <a:lumMod val="50000"/>
+                  </a:schemeClr>
                 </a:solidFill>
               </a:rPr>
               <a:t>Highlighted bullet format</a:t>
             </a:r>
           </a:p>
           <a:p>
-            <a:r>
-              <a:rPr lang="en-US">
-                <a:solidFill>
-                  <a:srgbClr val="000000"/>
+            <a:pPr lvl="1"/>
+            <a:r>
+              <a:rPr lang="en-US" dirty="0">
+                <a:solidFill>
+                  <a:srgbClr val="FF0000"/>
+                </a:solidFill>
+              </a:rPr>
+              <a:t>Level 2</a:t>
+            </a:r>
+          </a:p>
+          <a:p>
+            <a:pPr lvl="2"/>
+            <a:r>
+              <a:rPr lang="en-US" b="1" u="sng" dirty="0">
+                <a:solidFill>
+                  <a:srgbClr val="7030A0"/>
+                </a:solidFill>
+              </a:rPr>
+              <a:t>Level 3</a:t>
+            </a:r>
+          </a:p>
+          <a:p>
+            <a:pPr lvl="3"/>
+            <a:r>
+              <a:rPr lang="en-US" dirty="0">
+                <a:solidFill>
+                  <a:srgbClr val="FF0000"/>
+                </a:solidFill>
+              </a:rPr>
+              <a:t>Level 4</a:t>
+            </a:r>
+          </a:p>
+          <a:p>
+            <a:pPr lvl="4"/>
+            <a:r>
+              <a:rPr lang="en-US" dirty="0">
+                <a:solidFill>
+                  <a:srgbClr val="FF0000"/>
+                </a:solidFill>
+              </a:rPr>
+              <a:t>Level 5</a:t>
+            </a:r>
+          </a:p>
+          <a:p>
+            <a:pPr lvl="5"/>
+            <a:r>
+              <a:rPr lang="en-US" dirty="0">
+                <a:solidFill>
+                  <a:srgbClr val="FF0000"/>
+                </a:solidFill>
+              </a:rPr>
+              <a:t>Level 6</a:t>
+            </a:r>
+          </a:p>
+          <a:p>
+            <a:pPr lvl="6"/>
+            <a:r>
+              <a:rPr lang="en-US" dirty="0">
+                <a:solidFill>
+                  <a:srgbClr val="FF0000"/>
+                </a:solidFill>
+              </a:rPr>
+              <a:t>Level 7</a:t>
+            </a:r>
+          </a:p>
+          <a:p>
+            <a:pPr lvl="7"/>
+            <a:r>
+              <a:rPr lang="en-US" dirty="0">
+                <a:solidFill>
+                  <a:srgbClr val="FF0000"/>
+                </a:solidFill>
+              </a:rPr>
+              <a:t>Level 8</a:t>
+            </a:r>
+          </a:p>
+          <a:p>
+            <a:pPr lvl="8"/>
+            <a:r>
+              <a:rPr lang="en-US" b="1" i="1" dirty="0">
+                <a:solidFill>
+                  <a:srgbClr val="FF0000"/>
+                </a:solidFill>
+              </a:rPr>
+              <a:t>Level 9</a:t>
+            </a:r>
+          </a:p>
+          <a:p>
+            <a:r>
+              <a:rPr lang="en-US" u="sng" dirty="0">
+                <a:solidFill>
+                  <a:schemeClr val="accent6"/>
                 </a:solidFill>
               </a:rPr>
               <a:t>Unvisited bullet format</a:t>
             </a:r>
           </a:p>
           <a:p>
-            <a:pPr>
-              <a:buNone/>
-            </a:pPr>
-            <a:r>
-              <a:rPr lang="en-US">
+            <a:pPr lvl="1"/>
+            <a:r>
+              <a:rPr lang="en-US" dirty="0">
                 <a:solidFill>
                   <a:srgbClr val="000000"/>
                 </a:solidFill>
               </a:rPr>
-              <a:t> </a:t>
-            </a:r>
-          </a:p>
-          <a:p>
-            <a:pPr>
-              <a:buNone/>
-            </a:pPr>
-            <a:r>
-              <a:rPr lang="en-US">
+              <a:t>Level 2</a:t>
+            </a:r>
+          </a:p>
+          <a:p>
+            <a:pPr lvl="2"/>
+            <a:r>
+              <a:rPr lang="en-US" b="1" u="sng" dirty="0">
+                <a:solidFill>
+                  <a:schemeClr val="accent2"/>
+                </a:solidFill>
+                <a:highlight>
+                  <a:srgbClr val="00FFFF"/>
+                </a:highlight>
+              </a:rPr>
+              <a:t>Level 3</a:t>
+            </a:r>
+          </a:p>
+          <a:p>
+            <a:pPr lvl="3"/>
+            <a:r>
+              <a:rPr lang="en-US" dirty="0">
                 <a:solidFill>
                   <a:srgbClr val="000000"/>
                 </a:solidFill>
               </a:rPr>
-              <a:t> </a:t>
-            </a:r>
-          </a:p>
-          <a:p>
-            <a:pPr>
-              <a:buNone/>
-            </a:pPr>
-            <a:r>
-              <a:rPr lang="en-US">
+              <a:t>Level 4</a:t>
+            </a:r>
+          </a:p>
+          <a:p>
+            <a:pPr lvl="4"/>
+            <a:r>
+              <a:rPr lang="en-US" dirty="0">
                 <a:solidFill>
                   <a:srgbClr val="000000"/>
                 </a:solidFill>
               </a:rPr>
-              <a:t> </a:t>
+              <a:t>Level 5</a:t>
+            </a:r>
+          </a:p>
+          <a:p>
+            <a:pPr lvl="5"/>
+            <a:r>
+              <a:rPr lang="en-US" dirty="0">
+                <a:solidFill>
+                  <a:srgbClr val="000000"/>
+                </a:solidFill>
+              </a:rPr>
+              <a:t>Level 6</a:t>
+            </a:r>
+          </a:p>
+          <a:p>
+            <a:pPr lvl="6"/>
+            <a:r>
+              <a:rPr lang="en-US" dirty="0">
+                <a:solidFill>
+                  <a:srgbClr val="000000"/>
+                </a:solidFill>
+              </a:rPr>
+              <a:t>Level 7</a:t>
+            </a:r>
+          </a:p>
+          <a:p>
+            <a:pPr lvl="7"/>
+            <a:r>
+              <a:rPr lang="en-US" dirty="0">
+                <a:solidFill>
+                  <a:srgbClr val="000000"/>
+                </a:solidFill>
+              </a:rPr>
+              <a:t>Level 8</a:t>
+            </a:r>
+          </a:p>
+          <a:p>
+            <a:pPr lvl="8"/>
+            <a:r>
+              <a:rPr lang="en-US" b="1" i="1" dirty="0">
+                <a:solidFill>
+                  <a:srgbClr val="000000"/>
+                </a:solidFill>
+              </a:rPr>
+              <a:t>Level 9</a:t>
             </a:r>
           </a:p>
         </p:txBody>
@@ -7600,13 +7832,13 @@
               </a:spcBef>
               <a:buFont typeface="Arial" panose="020B0604020202020204" pitchFamily="34" charset="0"/>
               <a:buChar char="•"/>
-              <a:defRPr sz="2800">
+              <a:defRPr sz="2800" b="1">
                 <a:solidFill>
                   <a:srgbClr val="808080"/>
                 </a:solidFill>
               </a:defRPr>
             </a:lvl1pPr>
-            <a:lvl2pPr marL="685800" indent="-228600">
+            <a:lvl2pPr marL="685800" lvl="1" indent="-228600">
               <a:lnSpc>
                 <a:spcPct val="90000"/>
               </a:lnSpc>
@@ -7615,9 +7847,13 @@
               </a:spcBef>
               <a:buFont typeface="Arial" panose="020B0604020202020204" pitchFamily="34" charset="0"/>
               <a:buChar char="•"/>
-              <a:defRPr sz="2400"/>
+              <a:defRPr sz="2400">
+                <a:solidFill>
+                  <a:srgbClr val="808080"/>
+                </a:solidFill>
+              </a:defRPr>
             </a:lvl2pPr>
-            <a:lvl3pPr marL="1143000" indent="-228600">
+            <a:lvl3pPr marL="1143000" lvl="2" indent="-228600">
               <a:lnSpc>
                 <a:spcPct val="90000"/>
               </a:lnSpc>
@@ -7626,9 +7862,13 @@
               </a:spcBef>
               <a:buFont typeface="Arial" panose="020B0604020202020204" pitchFamily="34" charset="0"/>
               <a:buChar char="•"/>
-              <a:defRPr sz="2000"/>
+              <a:defRPr sz="2000" b="1" u="sng">
+                <a:solidFill>
+                  <a:schemeClr val="accent6"/>
+                </a:solidFill>
+              </a:defRPr>
             </a:lvl3pPr>
-            <a:lvl4pPr marL="1600200" indent="-228600">
+            <a:lvl4pPr marL="1600200" lvl="3" indent="-228600">
               <a:lnSpc>
                 <a:spcPct val="90000"/>
               </a:lnSpc>
@@ -7637,8 +7877,13 @@
               </a:spcBef>
               <a:buFont typeface="Arial" panose="020B0604020202020204" pitchFamily="34" charset="0"/>
               <a:buChar char="•"/>
+              <a:defRPr>
+                <a:solidFill>
+                  <a:srgbClr val="808080"/>
+                </a:solidFill>
+              </a:defRPr>
             </a:lvl4pPr>
-            <a:lvl5pPr marL="2057400" indent="-228600">
+            <a:lvl5pPr marL="2057400" lvl="4" indent="-228600">
               <a:lnSpc>
                 <a:spcPct val="90000"/>
               </a:lnSpc>
@@ -7647,8 +7892,13 @@
               </a:spcBef>
               <a:buFont typeface="Arial" panose="020B0604020202020204" pitchFamily="34" charset="0"/>
               <a:buChar char="•"/>
+              <a:defRPr>
+                <a:solidFill>
+                  <a:srgbClr val="808080"/>
+                </a:solidFill>
+              </a:defRPr>
             </a:lvl5pPr>
-            <a:lvl6pPr marL="2514600" indent="-228600">
+            <a:lvl6pPr marL="2514600" lvl="5" indent="-228600">
               <a:lnSpc>
                 <a:spcPct val="90000"/>
               </a:lnSpc>
@@ -7657,8 +7907,13 @@
               </a:spcBef>
               <a:buFont typeface="Arial" panose="020B0604020202020204" pitchFamily="34" charset="0"/>
               <a:buChar char="•"/>
+              <a:defRPr>
+                <a:solidFill>
+                  <a:srgbClr val="808080"/>
+                </a:solidFill>
+              </a:defRPr>
             </a:lvl6pPr>
-            <a:lvl7pPr marL="2971800" indent="-228600">
+            <a:lvl7pPr marL="2971800" lvl="6" indent="-228600">
               <a:lnSpc>
                 <a:spcPct val="90000"/>
               </a:lnSpc>
@@ -7667,8 +7922,13 @@
               </a:spcBef>
               <a:buFont typeface="Arial" panose="020B0604020202020204" pitchFamily="34" charset="0"/>
               <a:buChar char="•"/>
+              <a:defRPr>
+                <a:solidFill>
+                  <a:srgbClr val="808080"/>
+                </a:solidFill>
+              </a:defRPr>
             </a:lvl7pPr>
-            <a:lvl8pPr marL="3429000" indent="-228600">
+            <a:lvl8pPr marL="3429000" lvl="7" indent="-228600">
               <a:lnSpc>
                 <a:spcPct val="90000"/>
               </a:lnSpc>
@@ -7677,8 +7937,13 @@
               </a:spcBef>
               <a:buFont typeface="Arial" panose="020B0604020202020204" pitchFamily="34" charset="0"/>
               <a:buChar char="•"/>
+              <a:defRPr>
+                <a:solidFill>
+                  <a:srgbClr val="808080"/>
+                </a:solidFill>
+              </a:defRPr>
             </a:lvl8pPr>
-            <a:lvl9pPr marL="3886200" indent="-228600">
+            <a:lvl9pPr marL="3886200" lvl="8" indent="-228600">
               <a:lnSpc>
                 <a:spcPct val="90000"/>
               </a:lnSpc>
@@ -7687,42 +7952,59 @@
               </a:spcBef>
               <a:buFont typeface="Arial" panose="020B0604020202020204" pitchFamily="34" charset="0"/>
               <a:buChar char="•"/>
+              <a:defRPr b="1" i="1">
+                <a:solidFill>
+                  <a:srgbClr val="808080"/>
+                </a:solidFill>
+              </a:defRPr>
             </a:lvl9pPr>
           </a:lstStyle>
           <a:p>
             <a:pPr lvl="2"/>
             <a:r>
-              <a:rPr lang="en-US"/>
+              <a:rPr lang="en-US">
+                <a:solidFill>
+                  <a:srgbClr val="70AD47"/>
+                </a:solidFill>
+              </a:rPr>
               <a:t>Indent</a:t>
             </a:r>
-            <a:endParaRPr lang="en-US"/>
-          </a:p>
-          <a:p>
-            <a:r>
-              <a:rPr lang="en-US">
-                <a:solidFill>
-                  <a:srgbClr val="FF0000"/>
+            <a:endParaRPr lang="en-US">
+              <a:solidFill>
+                <a:srgbClr val="70AD47"/>
+              </a:solidFill>
+            </a:endParaRPr>
+          </a:p>
+          <a:p>
+            <a:r>
+              <a:rPr lang="en-US" b="0" i="1">
+                <a:solidFill>
+                  <a:srgbClr val="5B9BD5">
+                    <a:lumMod val="50000"/>
+                  </a:srgbClr>
                 </a:solidFill>
               </a:rPr>
               <a:t>NoIndent</a:t>
             </a:r>
-            <a:endParaRPr lang="en-US">
+            <a:endParaRPr lang="en-US" b="0" i="1">
               <a:solidFill>
-                <a:srgbClr val="FF0000"/>
+                <a:srgbClr val="5B9BD5">
+                  <a:lumMod val="50000"/>
+                </a:srgbClr>
               </a:solidFill>
             </a:endParaRPr>
           </a:p>
           <a:p>
             <a:pPr lvl="1"/>
             <a:r>
-              <a:rPr lang="en-US">
+              <a:rPr lang="en-US" sz="2500">
                 <a:solidFill>
                   <a:srgbClr val="000000"/>
                 </a:solidFill>
               </a:rPr>
               <a:t>IndentAgain</a:t>
             </a:r>
-            <a:endParaRPr lang="en-US">
+            <a:endParaRPr lang="en-US" sz="2500">
               <a:solidFill>
                 <a:srgbClr val="000000"/>
               </a:solidFill>
@@ -7730,36 +8012,29 @@
           </a:p>
           <a:p>
             <a:r>
-              <a:rPr lang="en-US">
-                <a:solidFill>
-                  <a:srgbClr val="000000"/>
+              <a:rPr lang="en-US" b="0" u="sng">
+                <a:solidFill>
+                  <a:srgbClr val="70AD47"/>
                 </a:solidFill>
               </a:rPr>
               <a:t>Dash-In-Name</a:t>
             </a:r>
-            <a:endParaRPr lang="en-US">
+            <a:endParaRPr lang="en-US" b="0" u="sng">
               <a:solidFill>
-                <a:srgbClr val="000000"/>
+                <a:srgbClr val="70AD47"/>
               </a:solidFill>
             </a:endParaRPr>
           </a:p>
           <a:p>
             <a:pPr lvl="8"/>
             <a:r>
-              <a:rPr lang="en-US">
+              <a:rPr lang="en-US" i="1">
                 <a:solidFill>
                   <a:srgbClr val="000000"/>
                 </a:solidFill>
               </a:rPr>
               <a:t>MoreThan9</a:t>
             </a:r>
-            <a:endParaRPr lang="en-US">
-              <a:solidFill>
-                <a:srgbClr val="000000"/>
-              </a:solidFill>
-            </a:endParaRPr>
-          </a:p>
-          <a:p>
             <a:endParaRPr lang="en-US"/>
           </a:p>
         </p:txBody>
@@ -8022,13 +8297,13 @@
               </a:spcBef>
               <a:buFont typeface="Arial" panose="020B0604020202020204" pitchFamily="34" charset="0"/>
               <a:buChar char="•"/>
-              <a:defRPr sz="2800">
+              <a:defRPr sz="2800" b="1">
                 <a:solidFill>
                   <a:srgbClr val="808080"/>
                 </a:solidFill>
               </a:defRPr>
             </a:lvl1pPr>
-            <a:lvl2pPr marL="685800" indent="-228600">
+            <a:lvl2pPr marL="685800" lvl="1" indent="-228600">
               <a:lnSpc>
                 <a:spcPct val="90000"/>
               </a:lnSpc>
@@ -8037,9 +8312,13 @@
               </a:spcBef>
               <a:buFont typeface="Arial" panose="020B0604020202020204" pitchFamily="34" charset="0"/>
               <a:buChar char="•"/>
-              <a:defRPr sz="2400"/>
+              <a:defRPr sz="2400">
+                <a:solidFill>
+                  <a:srgbClr val="808080"/>
+                </a:solidFill>
+              </a:defRPr>
             </a:lvl2pPr>
-            <a:lvl3pPr marL="1143000" indent="-228600">
+            <a:lvl3pPr marL="1143000" lvl="2" indent="-228600">
               <a:lnSpc>
                 <a:spcPct val="90000"/>
               </a:lnSpc>
@@ -8048,9 +8327,13 @@
               </a:spcBef>
               <a:buFont typeface="Arial" panose="020B0604020202020204" pitchFamily="34" charset="0"/>
               <a:buChar char="•"/>
-              <a:defRPr sz="2000"/>
+              <a:defRPr sz="2000" b="1" u="sng">
+                <a:solidFill>
+                  <a:schemeClr val="accent6"/>
+                </a:solidFill>
+              </a:defRPr>
             </a:lvl3pPr>
-            <a:lvl4pPr marL="1600200" indent="-228600">
+            <a:lvl4pPr marL="1600200" lvl="3" indent="-228600">
               <a:lnSpc>
                 <a:spcPct val="90000"/>
               </a:lnSpc>
@@ -8059,8 +8342,13 @@
               </a:spcBef>
               <a:buFont typeface="Arial" panose="020B0604020202020204" pitchFamily="34" charset="0"/>
               <a:buChar char="•"/>
+              <a:defRPr>
+                <a:solidFill>
+                  <a:srgbClr val="808080"/>
+                </a:solidFill>
+              </a:defRPr>
             </a:lvl4pPr>
-            <a:lvl5pPr marL="2057400" indent="-228600">
+            <a:lvl5pPr marL="2057400" lvl="4" indent="-228600">
               <a:lnSpc>
                 <a:spcPct val="90000"/>
               </a:lnSpc>
@@ -8069,8 +8357,13 @@
               </a:spcBef>
               <a:buFont typeface="Arial" panose="020B0604020202020204" pitchFamily="34" charset="0"/>
               <a:buChar char="•"/>
+              <a:defRPr>
+                <a:solidFill>
+                  <a:srgbClr val="808080"/>
+                </a:solidFill>
+              </a:defRPr>
             </a:lvl5pPr>
-            <a:lvl6pPr marL="2514600" indent="-228600">
+            <a:lvl6pPr marL="2514600" lvl="5" indent="-228600">
               <a:lnSpc>
                 <a:spcPct val="90000"/>
               </a:lnSpc>
@@ -8079,8 +8372,13 @@
               </a:spcBef>
               <a:buFont typeface="Arial" panose="020B0604020202020204" pitchFamily="34" charset="0"/>
               <a:buChar char="•"/>
+              <a:defRPr>
+                <a:solidFill>
+                  <a:srgbClr val="808080"/>
+                </a:solidFill>
+              </a:defRPr>
             </a:lvl6pPr>
-            <a:lvl7pPr marL="2971800" indent="-228600">
+            <a:lvl7pPr marL="2971800" lvl="6" indent="-228600">
               <a:lnSpc>
                 <a:spcPct val="90000"/>
               </a:lnSpc>
@@ -8089,8 +8387,13 @@
               </a:spcBef>
               <a:buFont typeface="Arial" panose="020B0604020202020204" pitchFamily="34" charset="0"/>
               <a:buChar char="•"/>
+              <a:defRPr>
+                <a:solidFill>
+                  <a:srgbClr val="808080"/>
+                </a:solidFill>
+              </a:defRPr>
             </a:lvl7pPr>
-            <a:lvl8pPr marL="3429000" indent="-228600">
+            <a:lvl8pPr marL="3429000" lvl="7" indent="-228600">
               <a:lnSpc>
                 <a:spcPct val="90000"/>
               </a:lnSpc>
@@ -8099,8 +8402,13 @@
               </a:spcBef>
               <a:buFont typeface="Arial" panose="020B0604020202020204" pitchFamily="34" charset="0"/>
               <a:buChar char="•"/>
+              <a:defRPr>
+                <a:solidFill>
+                  <a:srgbClr val="808080"/>
+                </a:solidFill>
+              </a:defRPr>
             </a:lvl8pPr>
-            <a:lvl9pPr marL="3886200" indent="-228600">
+            <a:lvl9pPr marL="3886200" lvl="8" indent="-228600">
               <a:lnSpc>
                 <a:spcPct val="90000"/>
               </a:lnSpc>
@@ -8109,15 +8417,28 @@
               </a:spcBef>
               <a:buFont typeface="Arial" panose="020B0604020202020204" pitchFamily="34" charset="0"/>
               <a:buChar char="•"/>
+              <a:defRPr b="1" i="1">
+                <a:solidFill>
+                  <a:srgbClr val="808080"/>
+                </a:solidFill>
+              </a:defRPr>
             </a:lvl9pPr>
           </a:lstStyle>
           <a:p>
             <a:pPr lvl="2"/>
             <a:r>
-              <a:rPr lang="en-US"/>
+              <a:rPr lang="en-US">
+                <a:solidFill>
+                  <a:srgbClr val="70AD47"/>
+                </a:solidFill>
+              </a:rPr>
               <a:t>Indent</a:t>
             </a:r>
-            <a:endParaRPr lang="en-US"/>
+            <a:endParaRPr lang="en-US">
+              <a:solidFill>
+                <a:srgbClr val="70AD47"/>
+              </a:solidFill>
+            </a:endParaRPr>
           </a:p>
           <a:p>
             <a:r>
@@ -8129,14 +8450,14 @@
           <a:p>
             <a:pPr lvl="1"/>
             <a:r>
-              <a:rPr lang="en-US">
+              <a:rPr lang="en-US" sz="2500">
                 <a:solidFill>
                   <a:srgbClr val="FF0000"/>
                 </a:solidFill>
               </a:rPr>
               <a:t>IndentAgain</a:t>
             </a:r>
-            <a:endParaRPr lang="en-US">
+            <a:endParaRPr lang="en-US" sz="2500">
               <a:solidFill>
                 <a:srgbClr val="FF0000"/>
               </a:solidFill>
@@ -8144,36 +8465,29 @@
           </a:p>
           <a:p>
             <a:r>
-              <a:rPr lang="en-US">
-                <a:solidFill>
-                  <a:srgbClr val="000000"/>
+              <a:rPr lang="en-US" b="0" u="sng">
+                <a:solidFill>
+                  <a:srgbClr val="70AD47"/>
                 </a:solidFill>
               </a:rPr>
               <a:t>Dash-In-Name</a:t>
             </a:r>
-            <a:endParaRPr lang="en-US">
+            <a:endParaRPr lang="en-US" b="0" u="sng">
               <a:solidFill>
-                <a:srgbClr val="000000"/>
+                <a:srgbClr val="70AD47"/>
               </a:solidFill>
             </a:endParaRPr>
           </a:p>
           <a:p>
             <a:pPr lvl="8"/>
             <a:r>
-              <a:rPr lang="en-US">
+              <a:rPr lang="en-US" i="1">
                 <a:solidFill>
                   <a:srgbClr val="000000"/>
                 </a:solidFill>
               </a:rPr>
               <a:t>MoreThan9</a:t>
             </a:r>
-            <a:endParaRPr lang="en-US">
-              <a:solidFill>
-                <a:srgbClr val="000000"/>
-              </a:solidFill>
-            </a:endParaRPr>
-          </a:p>
-          <a:p>
             <a:endParaRPr lang="en-US"/>
           </a:p>
         </p:txBody>
@@ -9551,13 +9865,13 @@
               </a:spcBef>
               <a:buFont typeface="Arial" panose="020B0604020202020204" pitchFamily="34" charset="0"/>
               <a:buChar char="•"/>
-              <a:defRPr sz="2800">
+              <a:defRPr sz="2800" b="1">
                 <a:solidFill>
                   <a:srgbClr val="808080"/>
                 </a:solidFill>
               </a:defRPr>
             </a:lvl1pPr>
-            <a:lvl2pPr marL="685800" indent="-228600">
+            <a:lvl2pPr marL="685800" lvl="1" indent="-228600">
               <a:lnSpc>
                 <a:spcPct val="90000"/>
               </a:lnSpc>
@@ -9566,9 +9880,13 @@
               </a:spcBef>
               <a:buFont typeface="Arial" panose="020B0604020202020204" pitchFamily="34" charset="0"/>
               <a:buChar char="•"/>
-              <a:defRPr sz="2400"/>
+              <a:defRPr sz="2400">
+                <a:solidFill>
+                  <a:srgbClr val="808080"/>
+                </a:solidFill>
+              </a:defRPr>
             </a:lvl2pPr>
-            <a:lvl3pPr marL="1143000" indent="-228600">
+            <a:lvl3pPr marL="1143000" lvl="2" indent="-228600">
               <a:lnSpc>
                 <a:spcPct val="90000"/>
               </a:lnSpc>
@@ -9577,9 +9895,13 @@
               </a:spcBef>
               <a:buFont typeface="Arial" panose="020B0604020202020204" pitchFamily="34" charset="0"/>
               <a:buChar char="•"/>
-              <a:defRPr sz="2000"/>
+              <a:defRPr sz="2000" b="1" u="sng">
+                <a:solidFill>
+                  <a:schemeClr val="accent6"/>
+                </a:solidFill>
+              </a:defRPr>
             </a:lvl3pPr>
-            <a:lvl4pPr marL="1600200" indent="-228600">
+            <a:lvl4pPr marL="1600200" lvl="3" indent="-228600">
               <a:lnSpc>
                 <a:spcPct val="90000"/>
               </a:lnSpc>
@@ -9588,8 +9910,13 @@
               </a:spcBef>
               <a:buFont typeface="Arial" panose="020B0604020202020204" pitchFamily="34" charset="0"/>
               <a:buChar char="•"/>
+              <a:defRPr>
+                <a:solidFill>
+                  <a:srgbClr val="808080"/>
+                </a:solidFill>
+              </a:defRPr>
             </a:lvl4pPr>
-            <a:lvl5pPr marL="2057400" indent="-228600">
+            <a:lvl5pPr marL="2057400" lvl="4" indent="-228600">
               <a:lnSpc>
                 <a:spcPct val="90000"/>
               </a:lnSpc>
@@ -9598,8 +9925,13 @@
               </a:spcBef>
               <a:buFont typeface="Arial" panose="020B0604020202020204" pitchFamily="34" charset="0"/>
               <a:buChar char="•"/>
+              <a:defRPr>
+                <a:solidFill>
+                  <a:srgbClr val="808080"/>
+                </a:solidFill>
+              </a:defRPr>
             </a:lvl5pPr>
-            <a:lvl6pPr marL="2514600" indent="-228600">
+            <a:lvl6pPr marL="2514600" lvl="5" indent="-228600">
               <a:lnSpc>
                 <a:spcPct val="90000"/>
               </a:lnSpc>
@@ -9608,8 +9940,13 @@
               </a:spcBef>
               <a:buFont typeface="Arial" panose="020B0604020202020204" pitchFamily="34" charset="0"/>
               <a:buChar char="•"/>
+              <a:defRPr>
+                <a:solidFill>
+                  <a:srgbClr val="808080"/>
+                </a:solidFill>
+              </a:defRPr>
             </a:lvl6pPr>
-            <a:lvl7pPr marL="2971800" indent="-228600">
+            <a:lvl7pPr marL="2971800" lvl="6" indent="-228600">
               <a:lnSpc>
                 <a:spcPct val="90000"/>
               </a:lnSpc>
@@ -9618,8 +9955,13 @@
               </a:spcBef>
               <a:buFont typeface="Arial" panose="020B0604020202020204" pitchFamily="34" charset="0"/>
               <a:buChar char="•"/>
+              <a:defRPr>
+                <a:solidFill>
+                  <a:srgbClr val="808080"/>
+                </a:solidFill>
+              </a:defRPr>
             </a:lvl7pPr>
-            <a:lvl8pPr marL="3429000" indent="-228600">
+            <a:lvl8pPr marL="3429000" lvl="7" indent="-228600">
               <a:lnSpc>
                 <a:spcPct val="90000"/>
               </a:lnSpc>
@@ -9628,8 +9970,13 @@
               </a:spcBef>
               <a:buFont typeface="Arial" panose="020B0604020202020204" pitchFamily="34" charset="0"/>
               <a:buChar char="•"/>
+              <a:defRPr>
+                <a:solidFill>
+                  <a:srgbClr val="808080"/>
+                </a:solidFill>
+              </a:defRPr>
             </a:lvl8pPr>
-            <a:lvl9pPr marL="3886200" indent="-228600">
+            <a:lvl9pPr marL="3886200" lvl="8" indent="-228600">
               <a:lnSpc>
                 <a:spcPct val="90000"/>
               </a:lnSpc>
@@ -9638,15 +9985,28 @@
               </a:spcBef>
               <a:buFont typeface="Arial" panose="020B0604020202020204" pitchFamily="34" charset="0"/>
               <a:buChar char="•"/>
+              <a:defRPr b="1" i="1">
+                <a:solidFill>
+                  <a:srgbClr val="808080"/>
+                </a:solidFill>
+              </a:defRPr>
             </a:lvl9pPr>
           </a:lstStyle>
           <a:p>
             <a:pPr lvl="2"/>
             <a:r>
-              <a:rPr lang="en-US"/>
+              <a:rPr lang="en-US">
+                <a:solidFill>
+                  <a:srgbClr val="70AD47"/>
+                </a:solidFill>
+              </a:rPr>
               <a:t>Indent</a:t>
             </a:r>
-            <a:endParaRPr lang="en-US"/>
+            <a:endParaRPr lang="en-US">
+              <a:solidFill>
+                <a:srgbClr val="70AD47"/>
+              </a:solidFill>
+            </a:endParaRPr>
           </a:p>
           <a:p>
             <a:r>
@@ -9658,14 +10018,14 @@
           <a:p>
             <a:pPr lvl="1"/>
             <a:r>
-              <a:rPr lang="en-US">
+              <a:rPr lang="en-US" sz="2500">
                 <a:solidFill>
                   <a:srgbClr val="FF0000"/>
                 </a:solidFill>
               </a:rPr>
               <a:t>IndentAgain</a:t>
             </a:r>
-            <a:endParaRPr lang="en-US">
+            <a:endParaRPr lang="en-US" sz="2500">
               <a:solidFill>
                 <a:srgbClr val="FF0000"/>
               </a:solidFill>
@@ -9673,36 +10033,29 @@
           </a:p>
           <a:p>
             <a:r>
-              <a:rPr lang="en-US">
-                <a:solidFill>
-                  <a:srgbClr val="000000"/>
+              <a:rPr lang="en-US" b="0" u="sng">
+                <a:solidFill>
+                  <a:srgbClr val="70AD47"/>
                 </a:solidFill>
               </a:rPr>
               <a:t>Dash-In-Name</a:t>
             </a:r>
-            <a:endParaRPr lang="en-US">
+            <a:endParaRPr lang="en-US" b="0" u="sng">
               <a:solidFill>
-                <a:srgbClr val="000000"/>
+                <a:srgbClr val="70AD47"/>
               </a:solidFill>
             </a:endParaRPr>
           </a:p>
           <a:p>
             <a:pPr lvl="8"/>
             <a:r>
-              <a:rPr lang="en-US">
+              <a:rPr lang="en-US" i="1">
                 <a:solidFill>
                   <a:srgbClr val="000000"/>
                 </a:solidFill>
               </a:rPr>
               <a:t>MoreThan9</a:t>
             </a:r>
-            <a:endParaRPr lang="en-US">
-              <a:solidFill>
-                <a:srgbClr val="000000"/>
-              </a:solidFill>
-            </a:endParaRPr>
-          </a:p>
-          <a:p>
             <a:endParaRPr lang="en-US"/>
           </a:p>
         </p:txBody>
@@ -9965,13 +10318,13 @@
               </a:spcBef>
               <a:buFont typeface="Arial" panose="020B0604020202020204" pitchFamily="34" charset="0"/>
               <a:buChar char="•"/>
-              <a:defRPr sz="2800">
+              <a:defRPr sz="2800" b="1">
                 <a:solidFill>
                   <a:srgbClr val="808080"/>
                 </a:solidFill>
               </a:defRPr>
             </a:lvl1pPr>
-            <a:lvl2pPr marL="685800" indent="-228600">
+            <a:lvl2pPr marL="685800" lvl="1" indent="-228600">
               <a:lnSpc>
                 <a:spcPct val="90000"/>
               </a:lnSpc>
@@ -9980,9 +10333,13 @@
               </a:spcBef>
               <a:buFont typeface="Arial" panose="020B0604020202020204" pitchFamily="34" charset="0"/>
               <a:buChar char="•"/>
-              <a:defRPr sz="2400"/>
+              <a:defRPr sz="2400">
+                <a:solidFill>
+                  <a:srgbClr val="808080"/>
+                </a:solidFill>
+              </a:defRPr>
             </a:lvl2pPr>
-            <a:lvl3pPr marL="1143000" indent="-228600">
+            <a:lvl3pPr marL="1143000" lvl="2" indent="-228600">
               <a:lnSpc>
                 <a:spcPct val="90000"/>
               </a:lnSpc>
@@ -9991,9 +10348,13 @@
               </a:spcBef>
               <a:buFont typeface="Arial" panose="020B0604020202020204" pitchFamily="34" charset="0"/>
               <a:buChar char="•"/>
-              <a:defRPr sz="2000"/>
+              <a:defRPr sz="2000" b="1" u="sng">
+                <a:solidFill>
+                  <a:schemeClr val="accent6"/>
+                </a:solidFill>
+              </a:defRPr>
             </a:lvl3pPr>
-            <a:lvl4pPr marL="1600200" indent="-228600">
+            <a:lvl4pPr marL="1600200" lvl="3" indent="-228600">
               <a:lnSpc>
                 <a:spcPct val="90000"/>
               </a:lnSpc>
@@ -10002,8 +10363,13 @@
               </a:spcBef>
               <a:buFont typeface="Arial" panose="020B0604020202020204" pitchFamily="34" charset="0"/>
               <a:buChar char="•"/>
+              <a:defRPr>
+                <a:solidFill>
+                  <a:srgbClr val="808080"/>
+                </a:solidFill>
+              </a:defRPr>
             </a:lvl4pPr>
-            <a:lvl5pPr marL="2057400" indent="-228600">
+            <a:lvl5pPr marL="2057400" lvl="4" indent="-228600">
               <a:lnSpc>
                 <a:spcPct val="90000"/>
               </a:lnSpc>
@@ -10012,8 +10378,13 @@
               </a:spcBef>
               <a:buFont typeface="Arial" panose="020B0604020202020204" pitchFamily="34" charset="0"/>
               <a:buChar char="•"/>
+              <a:defRPr>
+                <a:solidFill>
+                  <a:srgbClr val="808080"/>
+                </a:solidFill>
+              </a:defRPr>
             </a:lvl5pPr>
-            <a:lvl6pPr marL="2514600" indent="-228600">
+            <a:lvl6pPr marL="2514600" lvl="5" indent="-228600">
               <a:lnSpc>
                 <a:spcPct val="90000"/>
               </a:lnSpc>
@@ -10022,8 +10393,13 @@
               </a:spcBef>
               <a:buFont typeface="Arial" panose="020B0604020202020204" pitchFamily="34" charset="0"/>
               <a:buChar char="•"/>
+              <a:defRPr>
+                <a:solidFill>
+                  <a:srgbClr val="808080"/>
+                </a:solidFill>
+              </a:defRPr>
             </a:lvl6pPr>
-            <a:lvl7pPr marL="2971800" indent="-228600">
+            <a:lvl7pPr marL="2971800" lvl="6" indent="-228600">
               <a:lnSpc>
                 <a:spcPct val="90000"/>
               </a:lnSpc>
@@ -10032,8 +10408,13 @@
               </a:spcBef>
               <a:buFont typeface="Arial" panose="020B0604020202020204" pitchFamily="34" charset="0"/>
               <a:buChar char="•"/>
+              <a:defRPr>
+                <a:solidFill>
+                  <a:srgbClr val="808080"/>
+                </a:solidFill>
+              </a:defRPr>
             </a:lvl7pPr>
-            <a:lvl8pPr marL="3429000" indent="-228600">
+            <a:lvl8pPr marL="3429000" lvl="7" indent="-228600">
               <a:lnSpc>
                 <a:spcPct val="90000"/>
               </a:lnSpc>
@@ -10042,8 +10423,13 @@
               </a:spcBef>
               <a:buFont typeface="Arial" panose="020B0604020202020204" pitchFamily="34" charset="0"/>
               <a:buChar char="•"/>
+              <a:defRPr>
+                <a:solidFill>
+                  <a:srgbClr val="808080"/>
+                </a:solidFill>
+              </a:defRPr>
             </a:lvl8pPr>
-            <a:lvl9pPr marL="3886200" indent="-228600">
+            <a:lvl9pPr marL="3886200" lvl="8" indent="-228600">
               <a:lnSpc>
                 <a:spcPct val="90000"/>
               </a:lnSpc>
@@ -10052,15 +10438,28 @@
               </a:spcBef>
               <a:buFont typeface="Arial" panose="020B0604020202020204" pitchFamily="34" charset="0"/>
               <a:buChar char="•"/>
+              <a:defRPr b="1" i="1">
+                <a:solidFill>
+                  <a:srgbClr val="808080"/>
+                </a:solidFill>
+              </a:defRPr>
             </a:lvl9pPr>
           </a:lstStyle>
           <a:p>
             <a:pPr lvl="2"/>
             <a:r>
-              <a:rPr lang="en-US"/>
+              <a:rPr lang="en-US">
+                <a:solidFill>
+                  <a:srgbClr val="70AD47"/>
+                </a:solidFill>
+              </a:rPr>
               <a:t>Indent</a:t>
             </a:r>
-            <a:endParaRPr lang="en-US"/>
+            <a:endParaRPr lang="en-US">
+              <a:solidFill>
+                <a:srgbClr val="70AD47"/>
+              </a:solidFill>
+            </a:endParaRPr>
           </a:p>
           <a:p>
             <a:r>
@@ -10072,43 +10471,40 @@
           <a:p>
             <a:pPr lvl="1"/>
             <a:r>
-              <a:rPr lang="en-US"/>
+              <a:rPr lang="en-US" sz="2500"/>
               <a:t>IndentAgain</a:t>
             </a:r>
-            <a:endParaRPr lang="en-US"/>
-          </a:p>
-          <a:p>
-            <a:r>
-              <a:rPr lang="en-US">
-                <a:solidFill>
-                  <a:srgbClr val="FF0000"/>
+            <a:endParaRPr lang="en-US" sz="2500"/>
+          </a:p>
+          <a:p>
+            <a:r>
+              <a:rPr lang="en-US" b="0" i="1">
+                <a:solidFill>
+                  <a:srgbClr val="5B9BD5">
+                    <a:lumMod val="50000"/>
+                  </a:srgbClr>
                 </a:solidFill>
               </a:rPr>
               <a:t>Dash-In-Name</a:t>
             </a:r>
-            <a:endParaRPr lang="en-US">
+            <a:endParaRPr lang="en-US" b="0" i="1">
               <a:solidFill>
-                <a:srgbClr val="FF0000"/>
+                <a:srgbClr val="5B9BD5">
+                  <a:lumMod val="50000"/>
+                </a:srgbClr>
               </a:solidFill>
             </a:endParaRPr>
           </a:p>
           <a:p>
             <a:pPr lvl="8"/>
             <a:r>
-              <a:rPr lang="en-US">
+              <a:rPr lang="en-US" i="1">
                 <a:solidFill>
                   <a:srgbClr val="000000"/>
                 </a:solidFill>
               </a:rPr>
               <a:t>MoreThan9</a:t>
             </a:r>
-            <a:endParaRPr lang="en-US">
-              <a:solidFill>
-                <a:srgbClr val="000000"/>
-              </a:solidFill>
-            </a:endParaRPr>
-          </a:p>
-          <a:p>
             <a:endParaRPr lang="en-US"/>
           </a:p>
         </p:txBody>
@@ -11473,13 +11869,13 @@
               </a:spcBef>
               <a:buFont typeface="Arial" panose="020B0604020202020204" pitchFamily="34" charset="0"/>
               <a:buChar char="•"/>
-              <a:defRPr sz="2800">
+              <a:defRPr sz="2800" b="1">
                 <a:solidFill>
                   <a:srgbClr val="808080"/>
                 </a:solidFill>
               </a:defRPr>
             </a:lvl1pPr>
-            <a:lvl2pPr marL="685800" indent="-228600">
+            <a:lvl2pPr marL="685800" lvl="1" indent="-228600">
               <a:lnSpc>
                 <a:spcPct val="90000"/>
               </a:lnSpc>
@@ -11488,9 +11884,13 @@
               </a:spcBef>
               <a:buFont typeface="Arial" panose="020B0604020202020204" pitchFamily="34" charset="0"/>
               <a:buChar char="•"/>
-              <a:defRPr sz="2400"/>
+              <a:defRPr sz="2400">
+                <a:solidFill>
+                  <a:srgbClr val="808080"/>
+                </a:solidFill>
+              </a:defRPr>
             </a:lvl2pPr>
-            <a:lvl3pPr marL="1143000" indent="-228600">
+            <a:lvl3pPr marL="1143000" lvl="2" indent="-228600">
               <a:lnSpc>
                 <a:spcPct val="90000"/>
               </a:lnSpc>
@@ -11499,9 +11899,13 @@
               </a:spcBef>
               <a:buFont typeface="Arial" panose="020B0604020202020204" pitchFamily="34" charset="0"/>
               <a:buChar char="•"/>
-              <a:defRPr sz="2000"/>
+              <a:defRPr sz="2000" b="1" u="sng">
+                <a:solidFill>
+                  <a:schemeClr val="accent6"/>
+                </a:solidFill>
+              </a:defRPr>
             </a:lvl3pPr>
-            <a:lvl4pPr marL="1600200" indent="-228600">
+            <a:lvl4pPr marL="1600200" lvl="3" indent="-228600">
               <a:lnSpc>
                 <a:spcPct val="90000"/>
               </a:lnSpc>
@@ -11510,8 +11914,13 @@
               </a:spcBef>
               <a:buFont typeface="Arial" panose="020B0604020202020204" pitchFamily="34" charset="0"/>
               <a:buChar char="•"/>
+              <a:defRPr>
+                <a:solidFill>
+                  <a:srgbClr val="808080"/>
+                </a:solidFill>
+              </a:defRPr>
             </a:lvl4pPr>
-            <a:lvl5pPr marL="2057400" indent="-228600">
+            <a:lvl5pPr marL="2057400" lvl="4" indent="-228600">
               <a:lnSpc>
                 <a:spcPct val="90000"/>
               </a:lnSpc>
@@ -11520,8 +11929,13 @@
               </a:spcBef>
               <a:buFont typeface="Arial" panose="020B0604020202020204" pitchFamily="34" charset="0"/>
               <a:buChar char="•"/>
+              <a:defRPr>
+                <a:solidFill>
+                  <a:srgbClr val="808080"/>
+                </a:solidFill>
+              </a:defRPr>
             </a:lvl5pPr>
-            <a:lvl6pPr marL="2514600" indent="-228600">
+            <a:lvl6pPr marL="2514600" lvl="5" indent="-228600">
               <a:lnSpc>
                 <a:spcPct val="90000"/>
               </a:lnSpc>
@@ -11530,8 +11944,13 @@
               </a:spcBef>
               <a:buFont typeface="Arial" panose="020B0604020202020204" pitchFamily="34" charset="0"/>
               <a:buChar char="•"/>
+              <a:defRPr>
+                <a:solidFill>
+                  <a:srgbClr val="808080"/>
+                </a:solidFill>
+              </a:defRPr>
             </a:lvl6pPr>
-            <a:lvl7pPr marL="2971800" indent="-228600">
+            <a:lvl7pPr marL="2971800" lvl="6" indent="-228600">
               <a:lnSpc>
                 <a:spcPct val="90000"/>
               </a:lnSpc>
@@ -11540,8 +11959,13 @@
               </a:spcBef>
               <a:buFont typeface="Arial" panose="020B0604020202020204" pitchFamily="34" charset="0"/>
               <a:buChar char="•"/>
+              <a:defRPr>
+                <a:solidFill>
+                  <a:srgbClr val="808080"/>
+                </a:solidFill>
+              </a:defRPr>
             </a:lvl7pPr>
-            <a:lvl8pPr marL="3429000" indent="-228600">
+            <a:lvl8pPr marL="3429000" lvl="7" indent="-228600">
               <a:lnSpc>
                 <a:spcPct val="90000"/>
               </a:lnSpc>
@@ -11550,8 +11974,13 @@
               </a:spcBef>
               <a:buFont typeface="Arial" panose="020B0604020202020204" pitchFamily="34" charset="0"/>
               <a:buChar char="•"/>
+              <a:defRPr>
+                <a:solidFill>
+                  <a:srgbClr val="808080"/>
+                </a:solidFill>
+              </a:defRPr>
             </a:lvl8pPr>
-            <a:lvl9pPr marL="3886200" indent="-228600">
+            <a:lvl9pPr marL="3886200" lvl="8" indent="-228600">
               <a:lnSpc>
                 <a:spcPct val="90000"/>
               </a:lnSpc>
@@ -11560,15 +11989,28 @@
               </a:spcBef>
               <a:buFont typeface="Arial" panose="020B0604020202020204" pitchFamily="34" charset="0"/>
               <a:buChar char="•"/>
+              <a:defRPr b="1" i="1">
+                <a:solidFill>
+                  <a:srgbClr val="808080"/>
+                </a:solidFill>
+              </a:defRPr>
             </a:lvl9pPr>
           </a:lstStyle>
           <a:p>
             <a:pPr lvl="2"/>
             <a:r>
-              <a:rPr lang="en-US"/>
+              <a:rPr lang="en-US">
+                <a:solidFill>
+                  <a:srgbClr val="70AD47"/>
+                </a:solidFill>
+              </a:rPr>
               <a:t>Indent</a:t>
             </a:r>
-            <a:endParaRPr lang="en-US"/>
+            <a:endParaRPr lang="en-US">
+              <a:solidFill>
+                <a:srgbClr val="70AD47"/>
+              </a:solidFill>
+            </a:endParaRPr>
           </a:p>
           <a:p>
             <a:r>
@@ -11580,43 +12022,40 @@
           <a:p>
             <a:pPr lvl="1"/>
             <a:r>
-              <a:rPr lang="en-US"/>
+              <a:rPr lang="en-US" sz="2500"/>
               <a:t>IndentAgain</a:t>
             </a:r>
-            <a:endParaRPr lang="en-US"/>
-          </a:p>
-          <a:p>
-            <a:r>
-              <a:rPr lang="en-US">
-                <a:solidFill>
-                  <a:srgbClr val="FF0000"/>
+            <a:endParaRPr lang="en-US" sz="2500"/>
+          </a:p>
+          <a:p>
+            <a:r>
+              <a:rPr lang="en-US" b="0" i="1">
+                <a:solidFill>
+                  <a:srgbClr val="5B9BD5">
+                    <a:lumMod val="50000"/>
+                  </a:srgbClr>
                 </a:solidFill>
               </a:rPr>
               <a:t>Dash-In-Name</a:t>
             </a:r>
-            <a:endParaRPr lang="en-US">
+            <a:endParaRPr lang="en-US" b="0" i="1">
               <a:solidFill>
-                <a:srgbClr val="FF0000"/>
+                <a:srgbClr val="5B9BD5">
+                  <a:lumMod val="50000"/>
+                </a:srgbClr>
               </a:solidFill>
             </a:endParaRPr>
           </a:p>
           <a:p>
             <a:pPr lvl="8"/>
             <a:r>
-              <a:rPr lang="en-US">
+              <a:rPr lang="en-US" i="1">
                 <a:solidFill>
                   <a:srgbClr val="000000"/>
                 </a:solidFill>
               </a:rPr>
               <a:t>MoreThan9</a:t>
             </a:r>
-            <a:endParaRPr lang="en-US">
-              <a:solidFill>
-                <a:srgbClr val="000000"/>
-              </a:solidFill>
-            </a:endParaRPr>
-          </a:p>
-          <a:p>
             <a:endParaRPr lang="en-US"/>
           </a:p>
         </p:txBody>
@@ -11950,13 +12389,13 @@
               </a:spcBef>
               <a:buFont typeface="Arial" panose="020B0604020202020204" pitchFamily="34" charset="0"/>
               <a:buChar char="•"/>
-              <a:defRPr sz="2800">
+              <a:defRPr sz="2800" b="1">
                 <a:solidFill>
                   <a:srgbClr val="808080"/>
                 </a:solidFill>
               </a:defRPr>
             </a:lvl1pPr>
-            <a:lvl2pPr marL="685800" indent="-228600">
+            <a:lvl2pPr marL="685800" lvl="1" indent="-228600">
               <a:lnSpc>
                 <a:spcPct val="90000"/>
               </a:lnSpc>
@@ -11965,9 +12404,13 @@
               </a:spcBef>
               <a:buFont typeface="Arial" panose="020B0604020202020204" pitchFamily="34" charset="0"/>
               <a:buChar char="•"/>
-              <a:defRPr sz="2400"/>
+              <a:defRPr sz="2400">
+                <a:solidFill>
+                  <a:srgbClr val="808080"/>
+                </a:solidFill>
+              </a:defRPr>
             </a:lvl2pPr>
-            <a:lvl3pPr marL="1143000" indent="-228600">
+            <a:lvl3pPr marL="1143000" lvl="2" indent="-228600">
               <a:lnSpc>
                 <a:spcPct val="90000"/>
               </a:lnSpc>
@@ -11976,9 +12419,13 @@
               </a:spcBef>
               <a:buFont typeface="Arial" panose="020B0604020202020204" pitchFamily="34" charset="0"/>
               <a:buChar char="•"/>
-              <a:defRPr sz="2000"/>
+              <a:defRPr sz="2000" b="1" u="sng">
+                <a:solidFill>
+                  <a:schemeClr val="accent6"/>
+                </a:solidFill>
+              </a:defRPr>
             </a:lvl3pPr>
-            <a:lvl4pPr marL="1600200" indent="-228600">
+            <a:lvl4pPr marL="1600200" lvl="3" indent="-228600">
               <a:lnSpc>
                 <a:spcPct val="90000"/>
               </a:lnSpc>
@@ -11987,8 +12434,13 @@
               </a:spcBef>
               <a:buFont typeface="Arial" panose="020B0604020202020204" pitchFamily="34" charset="0"/>
               <a:buChar char="•"/>
+              <a:defRPr>
+                <a:solidFill>
+                  <a:srgbClr val="808080"/>
+                </a:solidFill>
+              </a:defRPr>
             </a:lvl4pPr>
-            <a:lvl5pPr marL="2057400" indent="-228600">
+            <a:lvl5pPr marL="2057400" lvl="4" indent="-228600">
               <a:lnSpc>
                 <a:spcPct val="90000"/>
               </a:lnSpc>
@@ -11997,8 +12449,13 @@
               </a:spcBef>
               <a:buFont typeface="Arial" panose="020B0604020202020204" pitchFamily="34" charset="0"/>
               <a:buChar char="•"/>
+              <a:defRPr>
+                <a:solidFill>
+                  <a:srgbClr val="808080"/>
+                </a:solidFill>
+              </a:defRPr>
             </a:lvl5pPr>
-            <a:lvl6pPr marL="2514600" indent="-228600">
+            <a:lvl6pPr marL="2514600" lvl="5" indent="-228600">
               <a:lnSpc>
                 <a:spcPct val="90000"/>
               </a:lnSpc>
@@ -12007,8 +12464,13 @@
               </a:spcBef>
               <a:buFont typeface="Arial" panose="020B0604020202020204" pitchFamily="34" charset="0"/>
               <a:buChar char="•"/>
+              <a:defRPr>
+                <a:solidFill>
+                  <a:srgbClr val="808080"/>
+                </a:solidFill>
+              </a:defRPr>
             </a:lvl6pPr>
-            <a:lvl7pPr marL="2971800" indent="-228600">
+            <a:lvl7pPr marL="2971800" lvl="6" indent="-228600">
               <a:lnSpc>
                 <a:spcPct val="90000"/>
               </a:lnSpc>
@@ -12017,8 +12479,13 @@
               </a:spcBef>
               <a:buFont typeface="Arial" panose="020B0604020202020204" pitchFamily="34" charset="0"/>
               <a:buChar char="•"/>
+              <a:defRPr>
+                <a:solidFill>
+                  <a:srgbClr val="808080"/>
+                </a:solidFill>
+              </a:defRPr>
             </a:lvl7pPr>
-            <a:lvl8pPr marL="3429000" indent="-228600">
+            <a:lvl8pPr marL="3429000" lvl="7" indent="-228600">
               <a:lnSpc>
                 <a:spcPct val="90000"/>
               </a:lnSpc>
@@ -12027,8 +12494,13 @@
               </a:spcBef>
               <a:buFont typeface="Arial" panose="020B0604020202020204" pitchFamily="34" charset="0"/>
               <a:buChar char="•"/>
+              <a:defRPr>
+                <a:solidFill>
+                  <a:srgbClr val="808080"/>
+                </a:solidFill>
+              </a:defRPr>
             </a:lvl8pPr>
-            <a:lvl9pPr marL="3886200" indent="-228600">
+            <a:lvl9pPr marL="3886200" lvl="8" indent="-228600">
               <a:lnSpc>
                 <a:spcPct val="90000"/>
               </a:lnSpc>
@@ -12037,15 +12509,28 @@
               </a:spcBef>
               <a:buFont typeface="Arial" panose="020B0604020202020204" pitchFamily="34" charset="0"/>
               <a:buChar char="•"/>
+              <a:defRPr b="1" i="1">
+                <a:solidFill>
+                  <a:srgbClr val="808080"/>
+                </a:solidFill>
+              </a:defRPr>
             </a:lvl9pPr>
           </a:lstStyle>
           <a:p>
             <a:pPr lvl="2"/>
             <a:r>
-              <a:rPr lang="en-US"/>
+              <a:rPr lang="en-US">
+                <a:solidFill>
+                  <a:srgbClr val="70AD47"/>
+                </a:solidFill>
+              </a:rPr>
               <a:t>Indent</a:t>
             </a:r>
-            <a:endParaRPr lang="en-US"/>
+            <a:endParaRPr lang="en-US">
+              <a:solidFill>
+                <a:srgbClr val="70AD47"/>
+              </a:solidFill>
+            </a:endParaRPr>
           </a:p>
           <a:p>
             <a:r>
@@ -12057,10 +12542,10 @@
           <a:p>
             <a:pPr lvl="1"/>
             <a:r>
-              <a:rPr lang="en-US"/>
+              <a:rPr lang="en-US" sz="2500"/>
               <a:t>IndentAgain</a:t>
             </a:r>
-            <a:endParaRPr lang="en-US"/>
+            <a:endParaRPr lang="en-US" sz="2500"/>
           </a:p>
           <a:p>
             <a:r>
@@ -13458,13 +13943,13 @@
               </a:spcBef>
               <a:buFont typeface="Arial" panose="020B0604020202020204" pitchFamily="34" charset="0"/>
               <a:buChar char="•"/>
-              <a:defRPr sz="2800">
+              <a:defRPr sz="2800" b="1">
                 <a:solidFill>
                   <a:srgbClr val="808080"/>
                 </a:solidFill>
               </a:defRPr>
             </a:lvl1pPr>
-            <a:lvl2pPr marL="685800" indent="-228600">
+            <a:lvl2pPr marL="685800" lvl="1" indent="-228600">
               <a:lnSpc>
                 <a:spcPct val="90000"/>
               </a:lnSpc>
@@ -13473,9 +13958,13 @@
               </a:spcBef>
               <a:buFont typeface="Arial" panose="020B0604020202020204" pitchFamily="34" charset="0"/>
               <a:buChar char="•"/>
-              <a:defRPr sz="2400"/>
+              <a:defRPr sz="2400">
+                <a:solidFill>
+                  <a:srgbClr val="808080"/>
+                </a:solidFill>
+              </a:defRPr>
             </a:lvl2pPr>
-            <a:lvl3pPr marL="1143000" indent="-228600">
+            <a:lvl3pPr marL="1143000" lvl="2" indent="-228600">
               <a:lnSpc>
                 <a:spcPct val="90000"/>
               </a:lnSpc>
@@ -13484,9 +13973,13 @@
               </a:spcBef>
               <a:buFont typeface="Arial" panose="020B0604020202020204" pitchFamily="34" charset="0"/>
               <a:buChar char="•"/>
-              <a:defRPr sz="2000"/>
+              <a:defRPr sz="2000" b="1" u="sng">
+                <a:solidFill>
+                  <a:schemeClr val="accent6"/>
+                </a:solidFill>
+              </a:defRPr>
             </a:lvl3pPr>
-            <a:lvl4pPr marL="1600200" indent="-228600">
+            <a:lvl4pPr marL="1600200" lvl="3" indent="-228600">
               <a:lnSpc>
                 <a:spcPct val="90000"/>
               </a:lnSpc>
@@ -13495,8 +13988,13 @@
               </a:spcBef>
               <a:buFont typeface="Arial" panose="020B0604020202020204" pitchFamily="34" charset="0"/>
               <a:buChar char="•"/>
+              <a:defRPr>
+                <a:solidFill>
+                  <a:srgbClr val="808080"/>
+                </a:solidFill>
+              </a:defRPr>
             </a:lvl4pPr>
-            <a:lvl5pPr marL="2057400" indent="-228600">
+            <a:lvl5pPr marL="2057400" lvl="4" indent="-228600">
               <a:lnSpc>
                 <a:spcPct val="90000"/>
               </a:lnSpc>
@@ -13505,8 +14003,13 @@
               </a:spcBef>
               <a:buFont typeface="Arial" panose="020B0604020202020204" pitchFamily="34" charset="0"/>
               <a:buChar char="•"/>
+              <a:defRPr>
+                <a:solidFill>
+                  <a:srgbClr val="808080"/>
+                </a:solidFill>
+              </a:defRPr>
             </a:lvl5pPr>
-            <a:lvl6pPr marL="2514600" indent="-228600">
+            <a:lvl6pPr marL="2514600" lvl="5" indent="-228600">
               <a:lnSpc>
                 <a:spcPct val="90000"/>
               </a:lnSpc>
@@ -13515,8 +14018,13 @@
               </a:spcBef>
               <a:buFont typeface="Arial" panose="020B0604020202020204" pitchFamily="34" charset="0"/>
               <a:buChar char="•"/>
+              <a:defRPr>
+                <a:solidFill>
+                  <a:srgbClr val="808080"/>
+                </a:solidFill>
+              </a:defRPr>
             </a:lvl6pPr>
-            <a:lvl7pPr marL="2971800" indent="-228600">
+            <a:lvl7pPr marL="2971800" lvl="6" indent="-228600">
               <a:lnSpc>
                 <a:spcPct val="90000"/>
               </a:lnSpc>
@@ -13525,8 +14033,13 @@
               </a:spcBef>
               <a:buFont typeface="Arial" panose="020B0604020202020204" pitchFamily="34" charset="0"/>
               <a:buChar char="•"/>
+              <a:defRPr>
+                <a:solidFill>
+                  <a:srgbClr val="808080"/>
+                </a:solidFill>
+              </a:defRPr>
             </a:lvl7pPr>
-            <a:lvl8pPr marL="3429000" indent="-228600">
+            <a:lvl8pPr marL="3429000" lvl="7" indent="-228600">
               <a:lnSpc>
                 <a:spcPct val="90000"/>
               </a:lnSpc>
@@ -13535,8 +14048,13 @@
               </a:spcBef>
               <a:buFont typeface="Arial" panose="020B0604020202020204" pitchFamily="34" charset="0"/>
               <a:buChar char="•"/>
+              <a:defRPr>
+                <a:solidFill>
+                  <a:srgbClr val="808080"/>
+                </a:solidFill>
+              </a:defRPr>
             </a:lvl8pPr>
-            <a:lvl9pPr marL="3886200" indent="-228600">
+            <a:lvl9pPr marL="3886200" lvl="8" indent="-228600">
               <a:lnSpc>
                 <a:spcPct val="90000"/>
               </a:lnSpc>
@@ -13545,15 +14063,28 @@
               </a:spcBef>
               <a:buFont typeface="Arial" panose="020B0604020202020204" pitchFamily="34" charset="0"/>
               <a:buChar char="•"/>
+              <a:defRPr b="1" i="1">
+                <a:solidFill>
+                  <a:srgbClr val="808080"/>
+                </a:solidFill>
+              </a:defRPr>
             </a:lvl9pPr>
           </a:lstStyle>
           <a:p>
             <a:pPr lvl="2"/>
             <a:r>
-              <a:rPr lang="en-US"/>
+              <a:rPr lang="en-US">
+                <a:solidFill>
+                  <a:srgbClr val="70AD47"/>
+                </a:solidFill>
+              </a:rPr>
               <a:t>Indent</a:t>
             </a:r>
-            <a:endParaRPr lang="en-US"/>
+            <a:endParaRPr lang="en-US">
+              <a:solidFill>
+                <a:srgbClr val="70AD47"/>
+              </a:solidFill>
+            </a:endParaRPr>
           </a:p>
           <a:p>
             <a:r>
@@ -13565,10 +14096,10 @@
           <a:p>
             <a:pPr lvl="1"/>
             <a:r>
-              <a:rPr lang="en-US"/>
+              <a:rPr lang="en-US" sz="2500"/>
               <a:t>IndentAgain</a:t>
             </a:r>
-            <a:endParaRPr lang="en-US"/>
+            <a:endParaRPr lang="en-US" sz="2500"/>
           </a:p>
           <a:p>
             <a:r>
@@ -13856,13 +14387,13 @@
               </a:spcBef>
               <a:buFont typeface="Arial" panose="020B0604020202020204" pitchFamily="34" charset="0"/>
               <a:buChar char="•"/>
-              <a:defRPr sz="2800">
+              <a:defRPr sz="2800" b="1">
                 <a:solidFill>
                   <a:srgbClr val="808080"/>
                 </a:solidFill>
               </a:defRPr>
             </a:lvl1pPr>
-            <a:lvl2pPr marL="685800" indent="-228600">
+            <a:lvl2pPr marL="685800" lvl="1" indent="-228600">
               <a:lnSpc>
                 <a:spcPct val="90000"/>
               </a:lnSpc>
@@ -13871,9 +14402,13 @@
               </a:spcBef>
               <a:buFont typeface="Arial" panose="020B0604020202020204" pitchFamily="34" charset="0"/>
               <a:buChar char="•"/>
-              <a:defRPr sz="2400"/>
+              <a:defRPr sz="2400">
+                <a:solidFill>
+                  <a:srgbClr val="808080"/>
+                </a:solidFill>
+              </a:defRPr>
             </a:lvl2pPr>
-            <a:lvl3pPr marL="1143000" indent="-228600">
+            <a:lvl3pPr marL="1143000" lvl="2" indent="-228600">
               <a:lnSpc>
                 <a:spcPct val="90000"/>
               </a:lnSpc>
@@ -13882,9 +14417,13 @@
               </a:spcBef>
               <a:buFont typeface="Arial" panose="020B0604020202020204" pitchFamily="34" charset="0"/>
               <a:buChar char="•"/>
-              <a:defRPr sz="2000"/>
+              <a:defRPr sz="2000" b="1" u="sng">
+                <a:solidFill>
+                  <a:schemeClr val="accent6"/>
+                </a:solidFill>
+              </a:defRPr>
             </a:lvl3pPr>
-            <a:lvl4pPr marL="1600200" indent="-228600">
+            <a:lvl4pPr marL="1600200" lvl="3" indent="-228600">
               <a:lnSpc>
                 <a:spcPct val="90000"/>
               </a:lnSpc>
@@ -13893,8 +14432,13 @@
               </a:spcBef>
               <a:buFont typeface="Arial" panose="020B0604020202020204" pitchFamily="34" charset="0"/>
               <a:buChar char="•"/>
+              <a:defRPr>
+                <a:solidFill>
+                  <a:srgbClr val="808080"/>
+                </a:solidFill>
+              </a:defRPr>
             </a:lvl4pPr>
-            <a:lvl5pPr marL="2057400" indent="-228600">
+            <a:lvl5pPr marL="2057400" lvl="4" indent="-228600">
               <a:lnSpc>
                 <a:spcPct val="90000"/>
               </a:lnSpc>
@@ -13903,8 +14447,13 @@
               </a:spcBef>
               <a:buFont typeface="Arial" panose="020B0604020202020204" pitchFamily="34" charset="0"/>
               <a:buChar char="•"/>
+              <a:defRPr>
+                <a:solidFill>
+                  <a:srgbClr val="808080"/>
+                </a:solidFill>
+              </a:defRPr>
             </a:lvl5pPr>
-            <a:lvl6pPr marL="2514600" indent="-228600">
+            <a:lvl6pPr marL="2514600" lvl="5" indent="-228600">
               <a:lnSpc>
                 <a:spcPct val="90000"/>
               </a:lnSpc>
@@ -13913,8 +14462,13 @@
               </a:spcBef>
               <a:buFont typeface="Arial" panose="020B0604020202020204" pitchFamily="34" charset="0"/>
               <a:buChar char="•"/>
+              <a:defRPr>
+                <a:solidFill>
+                  <a:srgbClr val="808080"/>
+                </a:solidFill>
+              </a:defRPr>
             </a:lvl6pPr>
-            <a:lvl7pPr marL="2971800" indent="-228600">
+            <a:lvl7pPr marL="2971800" lvl="6" indent="-228600">
               <a:lnSpc>
                 <a:spcPct val="90000"/>
               </a:lnSpc>
@@ -13923,8 +14477,13 @@
               </a:spcBef>
               <a:buFont typeface="Arial" panose="020B0604020202020204" pitchFamily="34" charset="0"/>
               <a:buChar char="•"/>
+              <a:defRPr>
+                <a:solidFill>
+                  <a:srgbClr val="808080"/>
+                </a:solidFill>
+              </a:defRPr>
             </a:lvl7pPr>
-            <a:lvl8pPr marL="3429000" indent="-228600">
+            <a:lvl8pPr marL="3429000" lvl="7" indent="-228600">
               <a:lnSpc>
                 <a:spcPct val="90000"/>
               </a:lnSpc>
@@ -13933,8 +14492,13 @@
               </a:spcBef>
               <a:buFont typeface="Arial" panose="020B0604020202020204" pitchFamily="34" charset="0"/>
               <a:buChar char="•"/>
+              <a:defRPr>
+                <a:solidFill>
+                  <a:srgbClr val="808080"/>
+                </a:solidFill>
+              </a:defRPr>
             </a:lvl8pPr>
-            <a:lvl9pPr marL="3886200" indent="-228600">
+            <a:lvl9pPr marL="3886200" lvl="8" indent="-228600">
               <a:lnSpc>
                 <a:spcPct val="90000"/>
               </a:lnSpc>
@@ -13943,15 +14507,28 @@
               </a:spcBef>
               <a:buFont typeface="Arial" panose="020B0604020202020204" pitchFamily="34" charset="0"/>
               <a:buChar char="•"/>
+              <a:defRPr b="1" i="1">
+                <a:solidFill>
+                  <a:srgbClr val="808080"/>
+                </a:solidFill>
+              </a:defRPr>
             </a:lvl9pPr>
           </a:lstStyle>
           <a:p>
             <a:pPr lvl="2"/>
             <a:r>
-              <a:rPr lang="en-US"/>
+              <a:rPr lang="en-US">
+                <a:solidFill>
+                  <a:srgbClr val="70AD47"/>
+                </a:solidFill>
+              </a:rPr>
               <a:t>Indent</a:t>
             </a:r>
-            <a:endParaRPr lang="en-US"/>
+            <a:endParaRPr lang="en-US">
+              <a:solidFill>
+                <a:srgbClr val="70AD47"/>
+              </a:solidFill>
+            </a:endParaRPr>
           </a:p>
           <a:p>
             <a:r>
@@ -13963,10 +14540,10 @@
           <a:p>
             <a:pPr lvl="1"/>
             <a:r>
-              <a:rPr lang="en-US"/>
+              <a:rPr lang="en-US" sz="2500"/>
               <a:t>IndentAgain</a:t>
             </a:r>
-            <a:endParaRPr lang="en-US"/>
+            <a:endParaRPr lang="en-US" sz="2500"/>
           </a:p>
           <a:p>
             <a:r>
@@ -14137,7 +14714,7 @@
       </p:grpSpPr>
       <p:pic>
         <p:nvPicPr>
-          <p:cNvPr id="2" name="Picture 1"/>
+          <p:cNvPr id="3" name="Picture 2"/>
           <p:cNvPicPr>
             <a:picLocks noChangeAspect="1"/>
           </p:cNvPicPr>
@@ -14168,7 +14745,7 @@
     </p:spTree>
     <p:extLst>
       <p:ext uri="{BB962C8B-B14F-4D97-AF65-F5344CB8AC3E}">
-        <p14:creationId xmlns:p14="http://schemas.microsoft.com/office/powerpoint/2010/main" val="4259341120"/>
+        <p14:creationId xmlns:p14="http://schemas.microsoft.com/office/powerpoint/2010/main" val="2464136178"/>
       </p:ext>
     </p:extLst>
   </p:cSld>
@@ -14306,13 +14883,13 @@
               </a:spcBef>
               <a:buFont typeface="Arial" panose="020B0604020202020204" pitchFamily="34" charset="0"/>
               <a:buChar char="•"/>
-              <a:defRPr sz="2800">
+              <a:defRPr sz="2800" b="1">
                 <a:solidFill>
                   <a:srgbClr val="808080"/>
                 </a:solidFill>
               </a:defRPr>
             </a:lvl1pPr>
-            <a:lvl2pPr marL="685800" indent="-228600">
+            <a:lvl2pPr marL="685800" lvl="1" indent="-228600">
               <a:lnSpc>
                 <a:spcPct val="90000"/>
               </a:lnSpc>
@@ -14321,9 +14898,13 @@
               </a:spcBef>
               <a:buFont typeface="Arial" panose="020B0604020202020204" pitchFamily="34" charset="0"/>
               <a:buChar char="•"/>
-              <a:defRPr sz="2400"/>
+              <a:defRPr sz="2400">
+                <a:solidFill>
+                  <a:srgbClr val="808080"/>
+                </a:solidFill>
+              </a:defRPr>
             </a:lvl2pPr>
-            <a:lvl3pPr marL="1143000" indent="-228600">
+            <a:lvl3pPr marL="1143000" lvl="2" indent="-228600">
               <a:lnSpc>
                 <a:spcPct val="90000"/>
               </a:lnSpc>
@@ -14332,9 +14913,13 @@
               </a:spcBef>
               <a:buFont typeface="Arial" panose="020B0604020202020204" pitchFamily="34" charset="0"/>
               <a:buChar char="•"/>
-              <a:defRPr sz="2000"/>
+              <a:defRPr sz="2000" b="1" u="sng">
+                <a:solidFill>
+                  <a:schemeClr val="accent6"/>
+                </a:solidFill>
+              </a:defRPr>
             </a:lvl3pPr>
-            <a:lvl4pPr marL="1600200" indent="-228600">
+            <a:lvl4pPr marL="1600200" lvl="3" indent="-228600">
               <a:lnSpc>
                 <a:spcPct val="90000"/>
               </a:lnSpc>
@@ -14343,8 +14928,13 @@
               </a:spcBef>
               <a:buFont typeface="Arial" panose="020B0604020202020204" pitchFamily="34" charset="0"/>
               <a:buChar char="•"/>
+              <a:defRPr>
+                <a:solidFill>
+                  <a:srgbClr val="808080"/>
+                </a:solidFill>
+              </a:defRPr>
             </a:lvl4pPr>
-            <a:lvl5pPr marL="2057400" indent="-228600">
+            <a:lvl5pPr marL="2057400" lvl="4" indent="-228600">
               <a:lnSpc>
                 <a:spcPct val="90000"/>
               </a:lnSpc>
@@ -14353,8 +14943,13 @@
               </a:spcBef>
               <a:buFont typeface="Arial" panose="020B0604020202020204" pitchFamily="34" charset="0"/>
               <a:buChar char="•"/>
+              <a:defRPr>
+                <a:solidFill>
+                  <a:srgbClr val="808080"/>
+                </a:solidFill>
+              </a:defRPr>
             </a:lvl5pPr>
-            <a:lvl6pPr marL="2514600" indent="-228600">
+            <a:lvl6pPr marL="2514600" lvl="5" indent="-228600">
               <a:lnSpc>
                 <a:spcPct val="90000"/>
               </a:lnSpc>
@@ -14363,8 +14958,13 @@
               </a:spcBef>
               <a:buFont typeface="Arial" panose="020B0604020202020204" pitchFamily="34" charset="0"/>
               <a:buChar char="•"/>
+              <a:defRPr>
+                <a:solidFill>
+                  <a:srgbClr val="808080"/>
+                </a:solidFill>
+              </a:defRPr>
             </a:lvl6pPr>
-            <a:lvl7pPr marL="2971800" indent="-228600">
+            <a:lvl7pPr marL="2971800" lvl="6" indent="-228600">
               <a:lnSpc>
                 <a:spcPct val="90000"/>
               </a:lnSpc>
@@ -14373,8 +14973,13 @@
               </a:spcBef>
               <a:buFont typeface="Arial" panose="020B0604020202020204" pitchFamily="34" charset="0"/>
               <a:buChar char="•"/>
+              <a:defRPr>
+                <a:solidFill>
+                  <a:srgbClr val="808080"/>
+                </a:solidFill>
+              </a:defRPr>
             </a:lvl7pPr>
-            <a:lvl8pPr marL="3429000" indent="-228600">
+            <a:lvl8pPr marL="3429000" lvl="7" indent="-228600">
               <a:lnSpc>
                 <a:spcPct val="90000"/>
               </a:lnSpc>
@@ -14383,8 +14988,13 @@
               </a:spcBef>
               <a:buFont typeface="Arial" panose="020B0604020202020204" pitchFamily="34" charset="0"/>
               <a:buChar char="•"/>
+              <a:defRPr>
+                <a:solidFill>
+                  <a:srgbClr val="808080"/>
+                </a:solidFill>
+              </a:defRPr>
             </a:lvl8pPr>
-            <a:lvl9pPr marL="3886200" indent="-228600">
+            <a:lvl9pPr marL="3886200" lvl="8" indent="-228600">
               <a:lnSpc>
                 <a:spcPct val="90000"/>
               </a:lnSpc>
@@ -14393,6 +15003,11 @@
               </a:spcBef>
               <a:buFont typeface="Arial" panose="020B0604020202020204" pitchFamily="34" charset="0"/>
               <a:buChar char="•"/>
+              <a:defRPr b="1" i="1">
+                <a:solidFill>
+                  <a:srgbClr val="808080"/>
+                </a:solidFill>
+              </a:defRPr>
             </a:lvl9pPr>
           </a:lstStyle>
           <a:p>
@@ -14400,12 +15015,49 @@
             <a:r>
               <a:rPr lang="en-US">
                 <a:solidFill>
-                  <a:srgbClr val="000000"/>
-                </a:solidFill>
+                  <a:srgbClr val="ED7D31"/>
+                </a:solidFill>
+                <a:highlight>
+                  <a:srgbClr val="00FFFF"/>
+                </a:highlight>
               </a:rPr>
               <a:t>Indent</a:t>
             </a:r>
             <a:endParaRPr lang="en-US">
+              <a:solidFill>
+                <a:srgbClr val="ED7D31"/>
+              </a:solidFill>
+              <a:highlight>
+                <a:srgbClr val="00FFFF"/>
+              </a:highlight>
+            </a:endParaRPr>
+          </a:p>
+          <a:p>
+            <a:r>
+              <a:rPr lang="en-US" b="0" u="sng">
+                <a:solidFill>
+                  <a:srgbClr val="70AD47"/>
+                </a:solidFill>
+              </a:rPr>
+              <a:t>NoIndent</a:t>
+            </a:r>
+            <a:endParaRPr lang="en-US" b="0" u="sng">
+              <a:solidFill>
+                <a:srgbClr val="70AD47"/>
+              </a:solidFill>
+            </a:endParaRPr>
+          </a:p>
+          <a:p>
+            <a:pPr lvl="1"/>
+            <a:r>
+              <a:rPr lang="en-US" sz="2500">
+                <a:solidFill>
+                  <a:srgbClr val="000000"/>
+                </a:solidFill>
+              </a:rPr>
+              <a:t>IndentAgain</a:t>
+            </a:r>
+            <a:endParaRPr lang="en-US" sz="2500">
               <a:solidFill>
                 <a:srgbClr val="000000"/>
               </a:solidFill>
@@ -14413,67 +15065,29 @@
           </a:p>
           <a:p>
             <a:r>
-              <a:rPr lang="en-US">
-                <a:solidFill>
-                  <a:srgbClr val="000000"/>
+              <a:rPr lang="en-US" b="0" u="sng">
+                <a:solidFill>
+                  <a:srgbClr val="70AD47"/>
                 </a:solidFill>
               </a:rPr>
-              <a:t>NoIndent</a:t>
-            </a:r>
-            <a:endParaRPr lang="en-US">
+              <a:t>Dash-In-Name</a:t>
+            </a:r>
+            <a:endParaRPr lang="en-US" b="0" u="sng">
               <a:solidFill>
-                <a:srgbClr val="000000"/>
+                <a:srgbClr val="70AD47"/>
               </a:solidFill>
             </a:endParaRPr>
           </a:p>
           <a:p>
-            <a:pPr lvl="1"/>
-            <a:r>
-              <a:rPr lang="en-US">
-                <a:solidFill>
-                  <a:srgbClr val="000000"/>
-                </a:solidFill>
-              </a:rPr>
-              <a:t>IndentAgain</a:t>
-            </a:r>
-            <a:endParaRPr lang="en-US">
-              <a:solidFill>
-                <a:srgbClr val="000000"/>
-              </a:solidFill>
-            </a:endParaRPr>
-          </a:p>
-          <a:p>
-            <a:r>
-              <a:rPr lang="en-US">
-                <a:solidFill>
-                  <a:srgbClr val="000000"/>
-                </a:solidFill>
-              </a:rPr>
-              <a:t>Dash-In-Name</a:t>
-            </a:r>
-            <a:endParaRPr lang="en-US">
-              <a:solidFill>
-                <a:srgbClr val="000000"/>
-              </a:solidFill>
-            </a:endParaRPr>
-          </a:p>
-          <a:p>
             <a:pPr lvl="8"/>
             <a:r>
-              <a:rPr lang="en-US">
+              <a:rPr lang="en-US" i="1">
                 <a:solidFill>
                   <a:srgbClr val="000000"/>
                 </a:solidFill>
               </a:rPr>
               <a:t>MoreThan9</a:t>
             </a:r>
-            <a:endParaRPr lang="en-US">
-              <a:solidFill>
-                <a:srgbClr val="000000"/>
-              </a:solidFill>
-            </a:endParaRPr>
-          </a:p>
-          <a:p>
             <a:endParaRPr lang="en-US"/>
           </a:p>
         </p:txBody>
@@ -14736,13 +15350,13 @@
               </a:spcBef>
               <a:buFont typeface="Arial" panose="020B0604020202020204" pitchFamily="34" charset="0"/>
               <a:buChar char="•"/>
-              <a:defRPr sz="2800">
+              <a:defRPr sz="2800" b="1">
                 <a:solidFill>
                   <a:srgbClr val="808080"/>
                 </a:solidFill>
               </a:defRPr>
             </a:lvl1pPr>
-            <a:lvl2pPr marL="685800" indent="-228600">
+            <a:lvl2pPr marL="685800" lvl="1" indent="-228600">
               <a:lnSpc>
                 <a:spcPct val="90000"/>
               </a:lnSpc>
@@ -14751,9 +15365,13 @@
               </a:spcBef>
               <a:buFont typeface="Arial" panose="020B0604020202020204" pitchFamily="34" charset="0"/>
               <a:buChar char="•"/>
-              <a:defRPr sz="2400"/>
+              <a:defRPr sz="2400">
+                <a:solidFill>
+                  <a:srgbClr val="808080"/>
+                </a:solidFill>
+              </a:defRPr>
             </a:lvl2pPr>
-            <a:lvl3pPr marL="1143000" indent="-228600">
+            <a:lvl3pPr marL="1143000" lvl="2" indent="-228600">
               <a:lnSpc>
                 <a:spcPct val="90000"/>
               </a:lnSpc>
@@ -14762,9 +15380,13 @@
               </a:spcBef>
               <a:buFont typeface="Arial" panose="020B0604020202020204" pitchFamily="34" charset="0"/>
               <a:buChar char="•"/>
-              <a:defRPr sz="2000"/>
+              <a:defRPr sz="2000" b="1" u="sng">
+                <a:solidFill>
+                  <a:schemeClr val="accent6"/>
+                </a:solidFill>
+              </a:defRPr>
             </a:lvl3pPr>
-            <a:lvl4pPr marL="1600200" indent="-228600">
+            <a:lvl4pPr marL="1600200" lvl="3" indent="-228600">
               <a:lnSpc>
                 <a:spcPct val="90000"/>
               </a:lnSpc>
@@ -14773,8 +15395,13 @@
               </a:spcBef>
               <a:buFont typeface="Arial" panose="020B0604020202020204" pitchFamily="34" charset="0"/>
               <a:buChar char="•"/>
+              <a:defRPr>
+                <a:solidFill>
+                  <a:srgbClr val="808080"/>
+                </a:solidFill>
+              </a:defRPr>
             </a:lvl4pPr>
-            <a:lvl5pPr marL="2057400" indent="-228600">
+            <a:lvl5pPr marL="2057400" lvl="4" indent="-228600">
               <a:lnSpc>
                 <a:spcPct val="90000"/>
               </a:lnSpc>
@@ -14783,8 +15410,13 @@
               </a:spcBef>
               <a:buFont typeface="Arial" panose="020B0604020202020204" pitchFamily="34" charset="0"/>
               <a:buChar char="•"/>
+              <a:defRPr>
+                <a:solidFill>
+                  <a:srgbClr val="808080"/>
+                </a:solidFill>
+              </a:defRPr>
             </a:lvl5pPr>
-            <a:lvl6pPr marL="2514600" indent="-228600">
+            <a:lvl6pPr marL="2514600" lvl="5" indent="-228600">
               <a:lnSpc>
                 <a:spcPct val="90000"/>
               </a:lnSpc>
@@ -14793,8 +15425,13 @@
               </a:spcBef>
               <a:buFont typeface="Arial" panose="020B0604020202020204" pitchFamily="34" charset="0"/>
               <a:buChar char="•"/>
+              <a:defRPr>
+                <a:solidFill>
+                  <a:srgbClr val="808080"/>
+                </a:solidFill>
+              </a:defRPr>
             </a:lvl6pPr>
-            <a:lvl7pPr marL="2971800" indent="-228600">
+            <a:lvl7pPr marL="2971800" lvl="6" indent="-228600">
               <a:lnSpc>
                 <a:spcPct val="90000"/>
               </a:lnSpc>
@@ -14803,8 +15440,13 @@
               </a:spcBef>
               <a:buFont typeface="Arial" panose="020B0604020202020204" pitchFamily="34" charset="0"/>
               <a:buChar char="•"/>
+              <a:defRPr>
+                <a:solidFill>
+                  <a:srgbClr val="808080"/>
+                </a:solidFill>
+              </a:defRPr>
             </a:lvl7pPr>
-            <a:lvl8pPr marL="3429000" indent="-228600">
+            <a:lvl8pPr marL="3429000" lvl="7" indent="-228600">
               <a:lnSpc>
                 <a:spcPct val="90000"/>
               </a:lnSpc>
@@ -14813,8 +15455,13 @@
               </a:spcBef>
               <a:buFont typeface="Arial" panose="020B0604020202020204" pitchFamily="34" charset="0"/>
               <a:buChar char="•"/>
+              <a:defRPr>
+                <a:solidFill>
+                  <a:srgbClr val="808080"/>
+                </a:solidFill>
+              </a:defRPr>
             </a:lvl8pPr>
-            <a:lvl9pPr marL="3886200" indent="-228600">
+            <a:lvl9pPr marL="3886200" lvl="8" indent="-228600">
               <a:lnSpc>
                 <a:spcPct val="90000"/>
               </a:lnSpc>
@@ -14823,6 +15470,11 @@
               </a:spcBef>
               <a:buFont typeface="Arial" panose="020B0604020202020204" pitchFamily="34" charset="0"/>
               <a:buChar char="•"/>
+              <a:defRPr b="1" i="1">
+                <a:solidFill>
+                  <a:srgbClr val="808080"/>
+                </a:solidFill>
+              </a:defRPr>
             </a:lvl9pPr>
           </a:lstStyle>
           <a:p>
@@ -14830,80 +15482,73 @@
             <a:r>
               <a:rPr lang="en-US">
                 <a:solidFill>
-                  <a:srgbClr val="FF0000"/>
+                  <a:srgbClr val="7030A0"/>
                 </a:solidFill>
               </a:rPr>
               <a:t>Indent</a:t>
             </a:r>
             <a:endParaRPr lang="en-US">
               <a:solidFill>
-                <a:srgbClr val="FF0000"/>
+                <a:srgbClr val="7030A0"/>
               </a:solidFill>
             </a:endParaRPr>
           </a:p>
           <a:p>
             <a:r>
-              <a:rPr lang="en-US">
-                <a:solidFill>
-                  <a:srgbClr val="000000"/>
+              <a:rPr lang="en-US" b="0" u="sng">
+                <a:solidFill>
+                  <a:srgbClr val="70AD47"/>
                 </a:solidFill>
               </a:rPr>
               <a:t>NoIndent</a:t>
             </a:r>
-            <a:endParaRPr lang="en-US">
+            <a:endParaRPr lang="en-US" b="0" u="sng">
+              <a:solidFill>
+                <a:srgbClr val="70AD47"/>
+              </a:solidFill>
+            </a:endParaRPr>
+          </a:p>
+          <a:p>
+            <a:pPr lvl="1"/>
+            <a:r>
+              <a:rPr lang="en-US" sz="2500">
+                <a:solidFill>
+                  <a:srgbClr val="000000"/>
+                </a:solidFill>
+              </a:rPr>
+              <a:t>IndentAgain</a:t>
+            </a:r>
+            <a:endParaRPr lang="en-US" sz="2500">
               <a:solidFill>
                 <a:srgbClr val="000000"/>
               </a:solidFill>
             </a:endParaRPr>
           </a:p>
           <a:p>
-            <a:pPr lvl="1"/>
-            <a:r>
-              <a:rPr lang="en-US">
-                <a:solidFill>
-                  <a:srgbClr val="000000"/>
+            <a:r>
+              <a:rPr lang="en-US" b="0" u="sng">
+                <a:solidFill>
+                  <a:srgbClr val="70AD47"/>
                 </a:solidFill>
               </a:rPr>
-              <a:t>IndentAgain</a:t>
-            </a:r>
-            <a:endParaRPr lang="en-US">
+              <a:t>Dash-In-Name</a:t>
+            </a:r>
+            <a:endParaRPr lang="en-US" b="0" u="sng">
               <a:solidFill>
-                <a:srgbClr val="000000"/>
+                <a:srgbClr val="70AD47"/>
               </a:solidFill>
             </a:endParaRPr>
           </a:p>
           <a:p>
-            <a:r>
-              <a:rPr lang="en-US">
-                <a:solidFill>
-                  <a:srgbClr val="000000"/>
-                </a:solidFill>
-              </a:rPr>
-              <a:t>Dash-In-Name</a:t>
-            </a:r>
-            <a:endParaRPr lang="en-US">
-              <a:solidFill>
-                <a:srgbClr val="000000"/>
-              </a:solidFill>
-            </a:endParaRPr>
-          </a:p>
-          <a:p>
             <a:pPr lvl="8"/>
             <a:r>
-              <a:rPr lang="en-US">
+              <a:rPr lang="en-US" i="1">
                 <a:solidFill>
                   <a:srgbClr val="000000"/>
                 </a:solidFill>
               </a:rPr>
               <a:t>MoreThan9</a:t>
             </a:r>
-            <a:endParaRPr lang="en-US">
-              <a:solidFill>
-                <a:srgbClr val="000000"/>
-              </a:solidFill>
-            </a:endParaRPr>
-          </a:p>
-          <a:p>
             <a:endParaRPr lang="en-US"/>
           </a:p>
         </p:txBody>
@@ -16273,13 +16918,13 @@
               </a:spcBef>
               <a:buFont typeface="Arial" panose="020B0604020202020204" pitchFamily="34" charset="0"/>
               <a:buChar char="•"/>
-              <a:defRPr sz="2800">
+              <a:defRPr sz="2800" b="1">
                 <a:solidFill>
                   <a:srgbClr val="808080"/>
                 </a:solidFill>
               </a:defRPr>
             </a:lvl1pPr>
-            <a:lvl2pPr marL="685800" indent="-228600">
+            <a:lvl2pPr marL="685800" lvl="1" indent="-228600">
               <a:lnSpc>
                 <a:spcPct val="90000"/>
               </a:lnSpc>
@@ -16288,9 +16933,13 @@
               </a:spcBef>
               <a:buFont typeface="Arial" panose="020B0604020202020204" pitchFamily="34" charset="0"/>
               <a:buChar char="•"/>
-              <a:defRPr sz="2400"/>
+              <a:defRPr sz="2400">
+                <a:solidFill>
+                  <a:srgbClr val="808080"/>
+                </a:solidFill>
+              </a:defRPr>
             </a:lvl2pPr>
-            <a:lvl3pPr marL="1143000" indent="-228600">
+            <a:lvl3pPr marL="1143000" lvl="2" indent="-228600">
               <a:lnSpc>
                 <a:spcPct val="90000"/>
               </a:lnSpc>
@@ -16299,9 +16948,13 @@
               </a:spcBef>
               <a:buFont typeface="Arial" panose="020B0604020202020204" pitchFamily="34" charset="0"/>
               <a:buChar char="•"/>
-              <a:defRPr sz="2000"/>
+              <a:defRPr sz="2000" b="1" u="sng">
+                <a:solidFill>
+                  <a:schemeClr val="accent6"/>
+                </a:solidFill>
+              </a:defRPr>
             </a:lvl3pPr>
-            <a:lvl4pPr marL="1600200" indent="-228600">
+            <a:lvl4pPr marL="1600200" lvl="3" indent="-228600">
               <a:lnSpc>
                 <a:spcPct val="90000"/>
               </a:lnSpc>
@@ -16310,8 +16963,13 @@
               </a:spcBef>
               <a:buFont typeface="Arial" panose="020B0604020202020204" pitchFamily="34" charset="0"/>
               <a:buChar char="•"/>
+              <a:defRPr>
+                <a:solidFill>
+                  <a:srgbClr val="808080"/>
+                </a:solidFill>
+              </a:defRPr>
             </a:lvl4pPr>
-            <a:lvl5pPr marL="2057400" indent="-228600">
+            <a:lvl5pPr marL="2057400" lvl="4" indent="-228600">
               <a:lnSpc>
                 <a:spcPct val="90000"/>
               </a:lnSpc>
@@ -16320,8 +16978,13 @@
               </a:spcBef>
               <a:buFont typeface="Arial" panose="020B0604020202020204" pitchFamily="34" charset="0"/>
               <a:buChar char="•"/>
+              <a:defRPr>
+                <a:solidFill>
+                  <a:srgbClr val="808080"/>
+                </a:solidFill>
+              </a:defRPr>
             </a:lvl5pPr>
-            <a:lvl6pPr marL="2514600" indent="-228600">
+            <a:lvl6pPr marL="2514600" lvl="5" indent="-228600">
               <a:lnSpc>
                 <a:spcPct val="90000"/>
               </a:lnSpc>
@@ -16330,8 +16993,13 @@
               </a:spcBef>
               <a:buFont typeface="Arial" panose="020B0604020202020204" pitchFamily="34" charset="0"/>
               <a:buChar char="•"/>
+              <a:defRPr>
+                <a:solidFill>
+                  <a:srgbClr val="808080"/>
+                </a:solidFill>
+              </a:defRPr>
             </a:lvl6pPr>
-            <a:lvl7pPr marL="2971800" indent="-228600">
+            <a:lvl7pPr marL="2971800" lvl="6" indent="-228600">
               <a:lnSpc>
                 <a:spcPct val="90000"/>
               </a:lnSpc>
@@ -16340,8 +17008,13 @@
               </a:spcBef>
               <a:buFont typeface="Arial" panose="020B0604020202020204" pitchFamily="34" charset="0"/>
               <a:buChar char="•"/>
+              <a:defRPr>
+                <a:solidFill>
+                  <a:srgbClr val="808080"/>
+                </a:solidFill>
+              </a:defRPr>
             </a:lvl7pPr>
-            <a:lvl8pPr marL="3429000" indent="-228600">
+            <a:lvl8pPr marL="3429000" lvl="7" indent="-228600">
               <a:lnSpc>
                 <a:spcPct val="90000"/>
               </a:lnSpc>
@@ -16350,8 +17023,13 @@
               </a:spcBef>
               <a:buFont typeface="Arial" panose="020B0604020202020204" pitchFamily="34" charset="0"/>
               <a:buChar char="•"/>
+              <a:defRPr>
+                <a:solidFill>
+                  <a:srgbClr val="808080"/>
+                </a:solidFill>
+              </a:defRPr>
             </a:lvl8pPr>
-            <a:lvl9pPr marL="3886200" indent="-228600">
+            <a:lvl9pPr marL="3886200" lvl="8" indent="-228600">
               <a:lnSpc>
                 <a:spcPct val="90000"/>
               </a:lnSpc>
@@ -16360,6 +17038,11 @@
               </a:spcBef>
               <a:buFont typeface="Arial" panose="020B0604020202020204" pitchFamily="34" charset="0"/>
               <a:buChar char="•"/>
+              <a:defRPr b="1" i="1">
+                <a:solidFill>
+                  <a:srgbClr val="808080"/>
+                </a:solidFill>
+              </a:defRPr>
             </a:lvl9pPr>
           </a:lstStyle>
           <a:p>
@@ -16367,80 +17050,73 @@
             <a:r>
               <a:rPr lang="en-US">
                 <a:solidFill>
-                  <a:srgbClr val="FF0000"/>
+                  <a:srgbClr val="7030A0"/>
                 </a:solidFill>
               </a:rPr>
               <a:t>Indent</a:t>
             </a:r>
             <a:endParaRPr lang="en-US">
               <a:solidFill>
-                <a:srgbClr val="FF0000"/>
+                <a:srgbClr val="7030A0"/>
               </a:solidFill>
             </a:endParaRPr>
           </a:p>
           <a:p>
             <a:r>
-              <a:rPr lang="en-US">
-                <a:solidFill>
-                  <a:srgbClr val="000000"/>
+              <a:rPr lang="en-US" b="0" u="sng">
+                <a:solidFill>
+                  <a:srgbClr val="70AD47"/>
                 </a:solidFill>
               </a:rPr>
               <a:t>NoIndent</a:t>
             </a:r>
-            <a:endParaRPr lang="en-US">
+            <a:endParaRPr lang="en-US" b="0" u="sng">
+              <a:solidFill>
+                <a:srgbClr val="70AD47"/>
+              </a:solidFill>
+            </a:endParaRPr>
+          </a:p>
+          <a:p>
+            <a:pPr lvl="1"/>
+            <a:r>
+              <a:rPr lang="en-US" sz="2500">
+                <a:solidFill>
+                  <a:srgbClr val="000000"/>
+                </a:solidFill>
+              </a:rPr>
+              <a:t>IndentAgain</a:t>
+            </a:r>
+            <a:endParaRPr lang="en-US" sz="2500">
               <a:solidFill>
                 <a:srgbClr val="000000"/>
               </a:solidFill>
             </a:endParaRPr>
           </a:p>
           <a:p>
-            <a:pPr lvl="1"/>
-            <a:r>
-              <a:rPr lang="en-US">
-                <a:solidFill>
-                  <a:srgbClr val="000000"/>
+            <a:r>
+              <a:rPr lang="en-US" b="0" u="sng">
+                <a:solidFill>
+                  <a:srgbClr val="70AD47"/>
                 </a:solidFill>
               </a:rPr>
-              <a:t>IndentAgain</a:t>
-            </a:r>
-            <a:endParaRPr lang="en-US">
+              <a:t>Dash-In-Name</a:t>
+            </a:r>
+            <a:endParaRPr lang="en-US" b="0" u="sng">
               <a:solidFill>
-                <a:srgbClr val="000000"/>
+                <a:srgbClr val="70AD47"/>
               </a:solidFill>
             </a:endParaRPr>
           </a:p>
           <a:p>
-            <a:r>
-              <a:rPr lang="en-US">
-                <a:solidFill>
-                  <a:srgbClr val="000000"/>
-                </a:solidFill>
-              </a:rPr>
-              <a:t>Dash-In-Name</a:t>
-            </a:r>
-            <a:endParaRPr lang="en-US">
-              <a:solidFill>
-                <a:srgbClr val="000000"/>
-              </a:solidFill>
-            </a:endParaRPr>
-          </a:p>
-          <a:p>
             <a:pPr lvl="8"/>
             <a:r>
-              <a:rPr lang="en-US">
+              <a:rPr lang="en-US" i="1">
                 <a:solidFill>
                   <a:srgbClr val="000000"/>
                 </a:solidFill>
               </a:rPr>
               <a:t>MoreThan9</a:t>
             </a:r>
-            <a:endParaRPr lang="en-US">
-              <a:solidFill>
-                <a:srgbClr val="000000"/>
-              </a:solidFill>
-            </a:endParaRPr>
-          </a:p>
-          <a:p>
             <a:endParaRPr lang="en-US"/>
           </a:p>
         </p:txBody>
@@ -16703,13 +17379,13 @@
               </a:spcBef>
               <a:buFont typeface="Arial" panose="020B0604020202020204" pitchFamily="34" charset="0"/>
               <a:buChar char="•"/>
-              <a:defRPr sz="2800">
+              <a:defRPr sz="2800" b="1">
                 <a:solidFill>
                   <a:srgbClr val="808080"/>
                 </a:solidFill>
               </a:defRPr>
             </a:lvl1pPr>
-            <a:lvl2pPr marL="685800" indent="-228600">
+            <a:lvl2pPr marL="685800" lvl="1" indent="-228600">
               <a:lnSpc>
                 <a:spcPct val="90000"/>
               </a:lnSpc>
@@ -16718,9 +17394,13 @@
               </a:spcBef>
               <a:buFont typeface="Arial" panose="020B0604020202020204" pitchFamily="34" charset="0"/>
               <a:buChar char="•"/>
-              <a:defRPr sz="2400"/>
+              <a:defRPr sz="2400">
+                <a:solidFill>
+                  <a:srgbClr val="808080"/>
+                </a:solidFill>
+              </a:defRPr>
             </a:lvl2pPr>
-            <a:lvl3pPr marL="1143000" indent="-228600">
+            <a:lvl3pPr marL="1143000" lvl="2" indent="-228600">
               <a:lnSpc>
                 <a:spcPct val="90000"/>
               </a:lnSpc>
@@ -16729,9 +17409,13 @@
               </a:spcBef>
               <a:buFont typeface="Arial" panose="020B0604020202020204" pitchFamily="34" charset="0"/>
               <a:buChar char="•"/>
-              <a:defRPr sz="2000"/>
+              <a:defRPr sz="2000" b="1" u="sng">
+                <a:solidFill>
+                  <a:schemeClr val="accent6"/>
+                </a:solidFill>
+              </a:defRPr>
             </a:lvl3pPr>
-            <a:lvl4pPr marL="1600200" indent="-228600">
+            <a:lvl4pPr marL="1600200" lvl="3" indent="-228600">
               <a:lnSpc>
                 <a:spcPct val="90000"/>
               </a:lnSpc>
@@ -16740,8 +17424,13 @@
               </a:spcBef>
               <a:buFont typeface="Arial" panose="020B0604020202020204" pitchFamily="34" charset="0"/>
               <a:buChar char="•"/>
+              <a:defRPr>
+                <a:solidFill>
+                  <a:srgbClr val="808080"/>
+                </a:solidFill>
+              </a:defRPr>
             </a:lvl4pPr>
-            <a:lvl5pPr marL="2057400" indent="-228600">
+            <a:lvl5pPr marL="2057400" lvl="4" indent="-228600">
               <a:lnSpc>
                 <a:spcPct val="90000"/>
               </a:lnSpc>
@@ -16750,8 +17439,13 @@
               </a:spcBef>
               <a:buFont typeface="Arial" panose="020B0604020202020204" pitchFamily="34" charset="0"/>
               <a:buChar char="•"/>
+              <a:defRPr>
+                <a:solidFill>
+                  <a:srgbClr val="808080"/>
+                </a:solidFill>
+              </a:defRPr>
             </a:lvl5pPr>
-            <a:lvl6pPr marL="2514600" indent="-228600">
+            <a:lvl6pPr marL="2514600" lvl="5" indent="-228600">
               <a:lnSpc>
                 <a:spcPct val="90000"/>
               </a:lnSpc>
@@ -16760,8 +17454,13 @@
               </a:spcBef>
               <a:buFont typeface="Arial" panose="020B0604020202020204" pitchFamily="34" charset="0"/>
               <a:buChar char="•"/>
+              <a:defRPr>
+                <a:solidFill>
+                  <a:srgbClr val="808080"/>
+                </a:solidFill>
+              </a:defRPr>
             </a:lvl6pPr>
-            <a:lvl7pPr marL="2971800" indent="-228600">
+            <a:lvl7pPr marL="2971800" lvl="6" indent="-228600">
               <a:lnSpc>
                 <a:spcPct val="90000"/>
               </a:lnSpc>
@@ -16770,8 +17469,13 @@
               </a:spcBef>
               <a:buFont typeface="Arial" panose="020B0604020202020204" pitchFamily="34" charset="0"/>
               <a:buChar char="•"/>
+              <a:defRPr>
+                <a:solidFill>
+                  <a:srgbClr val="808080"/>
+                </a:solidFill>
+              </a:defRPr>
             </a:lvl7pPr>
-            <a:lvl8pPr marL="3429000" indent="-228600">
+            <a:lvl8pPr marL="3429000" lvl="7" indent="-228600">
               <a:lnSpc>
                 <a:spcPct val="90000"/>
               </a:lnSpc>
@@ -16780,8 +17484,13 @@
               </a:spcBef>
               <a:buFont typeface="Arial" panose="020B0604020202020204" pitchFamily="34" charset="0"/>
               <a:buChar char="•"/>
+              <a:defRPr>
+                <a:solidFill>
+                  <a:srgbClr val="808080"/>
+                </a:solidFill>
+              </a:defRPr>
             </a:lvl8pPr>
-            <a:lvl9pPr marL="3886200" indent="-228600">
+            <a:lvl9pPr marL="3886200" lvl="8" indent="-228600">
               <a:lnSpc>
                 <a:spcPct val="90000"/>
               </a:lnSpc>
@@ -16790,42 +17499,59 @@
               </a:spcBef>
               <a:buFont typeface="Arial" panose="020B0604020202020204" pitchFamily="34" charset="0"/>
               <a:buChar char="•"/>
+              <a:defRPr b="1" i="1">
+                <a:solidFill>
+                  <a:srgbClr val="808080"/>
+                </a:solidFill>
+              </a:defRPr>
             </a:lvl9pPr>
           </a:lstStyle>
           <a:p>
             <a:pPr lvl="2"/>
             <a:r>
-              <a:rPr lang="en-US"/>
+              <a:rPr lang="en-US">
+                <a:solidFill>
+                  <a:srgbClr val="70AD47"/>
+                </a:solidFill>
+              </a:rPr>
               <a:t>Indent</a:t>
             </a:r>
-            <a:endParaRPr lang="en-US"/>
-          </a:p>
-          <a:p>
-            <a:r>
-              <a:rPr lang="en-US">
-                <a:solidFill>
-                  <a:srgbClr val="FF0000"/>
+            <a:endParaRPr lang="en-US">
+              <a:solidFill>
+                <a:srgbClr val="70AD47"/>
+              </a:solidFill>
+            </a:endParaRPr>
+          </a:p>
+          <a:p>
+            <a:r>
+              <a:rPr lang="en-US" b="0" i="1">
+                <a:solidFill>
+                  <a:srgbClr val="5B9BD5">
+                    <a:lumMod val="50000"/>
+                  </a:srgbClr>
                 </a:solidFill>
               </a:rPr>
               <a:t>NoIndent</a:t>
             </a:r>
-            <a:endParaRPr lang="en-US">
+            <a:endParaRPr lang="en-US" b="0" i="1">
               <a:solidFill>
-                <a:srgbClr val="FF0000"/>
+                <a:srgbClr val="5B9BD5">
+                  <a:lumMod val="50000"/>
+                </a:srgbClr>
               </a:solidFill>
             </a:endParaRPr>
           </a:p>
           <a:p>
             <a:pPr lvl="1"/>
             <a:r>
-              <a:rPr lang="en-US">
+              <a:rPr lang="en-US" sz="2500">
                 <a:solidFill>
                   <a:srgbClr val="000000"/>
                 </a:solidFill>
               </a:rPr>
               <a:t>IndentAgain</a:t>
             </a:r>
-            <a:endParaRPr lang="en-US">
+            <a:endParaRPr lang="en-US" sz="2500">
               <a:solidFill>
                 <a:srgbClr val="000000"/>
               </a:solidFill>
@@ -16833,36 +17559,29 @@
           </a:p>
           <a:p>
             <a:r>
-              <a:rPr lang="en-US">
-                <a:solidFill>
-                  <a:srgbClr val="000000"/>
+              <a:rPr lang="en-US" b="0" u="sng">
+                <a:solidFill>
+                  <a:srgbClr val="70AD47"/>
                 </a:solidFill>
               </a:rPr>
               <a:t>Dash-In-Name</a:t>
             </a:r>
-            <a:endParaRPr lang="en-US">
+            <a:endParaRPr lang="en-US" b="0" u="sng">
               <a:solidFill>
-                <a:srgbClr val="000000"/>
+                <a:srgbClr val="70AD47"/>
               </a:solidFill>
             </a:endParaRPr>
           </a:p>
           <a:p>
             <a:pPr lvl="8"/>
             <a:r>
-              <a:rPr lang="en-US">
+              <a:rPr lang="en-US" i="1">
                 <a:solidFill>
                   <a:srgbClr val="000000"/>
                 </a:solidFill>
               </a:rPr>
               <a:t>MoreThan9</a:t>
             </a:r>
-            <a:endParaRPr lang="en-US">
-              <a:solidFill>
-                <a:srgbClr val="000000"/>
-              </a:solidFill>
-            </a:endParaRPr>
-          </a:p>
-          <a:p>
             <a:endParaRPr lang="en-US"/>
           </a:p>
         </p:txBody>

</xml_diff>